<commit_message>
Payloadok, beef, bruteforce, wordlist-attack.
</commit_message>
<xml_diff>
--- a/Etikus hackelés.pptx
+++ b/Etikus hackelés.pptx
@@ -8,9 +8,14 @@
     <p:sldId id="256" r:id="rId2"/>
     <p:sldId id="257" r:id="rId3"/>
     <p:sldId id="258" r:id="rId4"/>
-    <p:sldId id="259" r:id="rId5"/>
-    <p:sldId id="260" r:id="rId6"/>
-    <p:sldId id="261" r:id="rId7"/>
+    <p:sldId id="262" r:id="rId5"/>
+    <p:sldId id="263" r:id="rId6"/>
+    <p:sldId id="259" r:id="rId7"/>
+    <p:sldId id="264" r:id="rId8"/>
+    <p:sldId id="266" r:id="rId9"/>
+    <p:sldId id="267" r:id="rId10"/>
+    <p:sldId id="268" r:id="rId11"/>
+    <p:sldId id="260" r:id="rId12"/>
   </p:sldIdLst>
   <p:sldSz cx="12192000" cy="6858000"/>
   <p:notesSz cx="6858000" cy="9144000"/>
@@ -109,6 +114,11 @@
       </a:defRPr>
     </a:lvl9pPr>
   </p:defaultTextStyle>
+  <p:extLst>
+    <p:ext uri="{EFAFB233-063F-42B5-8137-9DF3F51BA10A}">
+      <p15:sldGuideLst xmlns:p15="http://schemas.microsoft.com/office/powerpoint/2012/main"/>
+    </p:ext>
+  </p:extLst>
 </p:presentation>
 </file>
 
@@ -171,7 +181,7 @@
           </a:lstStyle>
           <a:p>
             <a:r>
-              <a:rPr lang="hu-HU" smtClean="0"/>
+              <a:rPr lang="hu-HU"/>
               <a:t>Mintacím szerkesztése</a:t>
             </a:r>
             <a:endParaRPr lang="en-US" dirty="0"/>
@@ -301,7 +311,7 @@
           </a:lstStyle>
           <a:p>
             <a:r>
-              <a:rPr lang="hu-HU" smtClean="0"/>
+              <a:rPr lang="hu-HU"/>
               <a:t>Kattintson ide az alcím mintájának szerkesztéséhez</a:t>
             </a:r>
             <a:endParaRPr lang="en-US" dirty="0"/>
@@ -427,7 +437,7 @@
           </a:lstStyle>
           <a:p>
             <a:r>
-              <a:rPr lang="hu-HU" smtClean="0"/>
+              <a:rPr lang="hu-HU"/>
               <a:t>Mintacím szerkesztése</a:t>
             </a:r>
             <a:endParaRPr lang="en-US" dirty="0"/>
@@ -522,7 +532,7 @@
           </a:lstStyle>
           <a:p>
             <a:r>
-              <a:rPr lang="hu-HU" smtClean="0"/>
+              <a:rPr lang="hu-HU"/>
               <a:t>Kép beszúrásához kattintson az ikonra</a:t>
             </a:r>
             <a:endParaRPr lang="en-US" dirty="0"/>
@@ -590,7 +600,7 @@
           <a:p>
             <a:pPr lvl="0"/>
             <a:r>
-              <a:rPr lang="hu-HU" smtClean="0"/>
+              <a:rPr lang="hu-HU"/>
               <a:t>Mintaszöveg szerkesztése</a:t>
             </a:r>
           </a:p>
@@ -715,7 +725,7 @@
           </a:lstStyle>
           <a:p>
             <a:r>
-              <a:rPr lang="hu-HU" smtClean="0"/>
+              <a:rPr lang="hu-HU"/>
               <a:t>Mintacím szerkesztése</a:t>
             </a:r>
             <a:endParaRPr lang="en-US" dirty="0"/>
@@ -846,7 +856,7 @@
           <a:p>
             <a:pPr lvl="0"/>
             <a:r>
-              <a:rPr lang="hu-HU" smtClean="0"/>
+              <a:rPr lang="hu-HU"/>
               <a:t>Mintaszöveg szerkesztése</a:t>
             </a:r>
           </a:p>
@@ -1205,7 +1215,7 @@
           </a:lstStyle>
           <a:p>
             <a:r>
-              <a:rPr lang="hu-HU" smtClean="0"/>
+              <a:rPr lang="hu-HU"/>
               <a:t>Mintacím szerkesztése</a:t>
             </a:r>
             <a:endParaRPr lang="en-US" dirty="0"/>
@@ -1260,7 +1270,7 @@
           <a:p>
             <a:pPr lvl="0"/>
             <a:r>
-              <a:rPr lang="hu-HU" smtClean="0"/>
+              <a:rPr lang="hu-HU"/>
               <a:t>Mintaszöveg szerkesztése</a:t>
             </a:r>
           </a:p>
@@ -1312,7 +1322,7 @@
               <a:buNone/>
             </a:pPr>
             <a:r>
-              <a:rPr lang="hu-HU" smtClean="0"/>
+              <a:rPr lang="hu-HU"/>
               <a:t>Mintaszöveg szerkesztése</a:t>
             </a:r>
           </a:p>
@@ -1437,7 +1447,7 @@
           </a:lstStyle>
           <a:p>
             <a:r>
-              <a:rPr lang="hu-HU" smtClean="0"/>
+              <a:rPr lang="hu-HU"/>
               <a:t>Mintacím szerkesztése</a:t>
             </a:r>
             <a:endParaRPr lang="en-US" dirty="0"/>
@@ -1489,7 +1499,7 @@
               <a:buNone/>
             </a:pPr>
             <a:r>
-              <a:rPr lang="hu-HU" smtClean="0"/>
+              <a:rPr lang="hu-HU"/>
               <a:t>Mintaszöveg szerkesztése</a:t>
             </a:r>
           </a:p>
@@ -1859,7 +1869,7 @@
           </a:lstStyle>
           <a:p>
             <a:r>
-              <a:rPr lang="hu-HU" smtClean="0"/>
+              <a:rPr lang="hu-HU"/>
               <a:t>Mintacím szerkesztése</a:t>
             </a:r>
             <a:endParaRPr lang="en-US" dirty="0"/>
@@ -1932,7 +1942,7 @@
               <a:buNone/>
             </a:pPr>
             <a:r>
-              <a:rPr lang="hu-HU" smtClean="0"/>
+              <a:rPr lang="hu-HU"/>
               <a:t>Mintaszöveg szerkesztése</a:t>
             </a:r>
           </a:p>
@@ -2062,7 +2072,7 @@
           <a:p>
             <a:pPr lvl="0"/>
             <a:r>
-              <a:rPr lang="hu-HU" smtClean="0"/>
+              <a:rPr lang="hu-HU"/>
               <a:t>Mintaszöveg szerkesztése</a:t>
             </a:r>
           </a:p>
@@ -2188,7 +2198,7 @@
           <a:p>
             <a:pPr marL="0" lvl="0"/>
             <a:r>
-              <a:rPr lang="hu-HU" smtClean="0"/>
+              <a:rPr lang="hu-HU"/>
               <a:t>Mintacím szerkesztése</a:t>
             </a:r>
             <a:endParaRPr lang="en-US" dirty="0"/>
@@ -2261,7 +2271,7 @@
               <a:buNone/>
             </a:pPr>
             <a:r>
-              <a:rPr lang="hu-HU" smtClean="0"/>
+              <a:rPr lang="hu-HU"/>
               <a:t>Mintaszöveg szerkesztése</a:t>
             </a:r>
           </a:p>
@@ -2391,7 +2401,7 @@
           <a:p>
             <a:pPr lvl="0"/>
             <a:r>
-              <a:rPr lang="hu-HU" smtClean="0"/>
+              <a:rPr lang="hu-HU"/>
               <a:t>Mintaszöveg szerkesztése</a:t>
             </a:r>
           </a:p>
@@ -2510,7 +2520,7 @@
           <a:lstStyle/>
           <a:p>
             <a:r>
-              <a:rPr lang="hu-HU" smtClean="0"/>
+              <a:rPr lang="hu-HU"/>
               <a:t>Mintacím szerkesztése</a:t>
             </a:r>
             <a:endParaRPr lang="en-US" dirty="0"/>
@@ -2534,35 +2544,35 @@
           <a:p>
             <a:pPr lvl="0"/>
             <a:r>
-              <a:rPr lang="hu-HU" smtClean="0"/>
+              <a:rPr lang="hu-HU"/>
               <a:t>Mintaszöveg szerkesztése</a:t>
             </a:r>
           </a:p>
           <a:p>
             <a:pPr lvl="1"/>
             <a:r>
-              <a:rPr lang="hu-HU" smtClean="0"/>
+              <a:rPr lang="hu-HU"/>
               <a:t>Második szint</a:t>
             </a:r>
           </a:p>
           <a:p>
             <a:pPr lvl="2"/>
             <a:r>
-              <a:rPr lang="hu-HU" smtClean="0"/>
+              <a:rPr lang="hu-HU"/>
               <a:t>Harmadik szint</a:t>
             </a:r>
           </a:p>
           <a:p>
             <a:pPr lvl="3"/>
             <a:r>
-              <a:rPr lang="hu-HU" smtClean="0"/>
+              <a:rPr lang="hu-HU"/>
               <a:t>Negyedik szint</a:t>
             </a:r>
           </a:p>
           <a:p>
             <a:pPr lvl="4"/>
             <a:r>
-              <a:rPr lang="hu-HU" smtClean="0"/>
+              <a:rPr lang="hu-HU"/>
               <a:t>Ötödik szint</a:t>
             </a:r>
             <a:endParaRPr lang="en-US" dirty="0"/>
@@ -2682,7 +2692,7 @@
           <a:lstStyle/>
           <a:p>
             <a:r>
-              <a:rPr lang="hu-HU" smtClean="0"/>
+              <a:rPr lang="hu-HU"/>
               <a:t>Mintacím szerkesztése</a:t>
             </a:r>
             <a:endParaRPr lang="en-US" dirty="0"/>
@@ -2711,35 +2721,35 @@
           <a:p>
             <a:pPr lvl="0"/>
             <a:r>
-              <a:rPr lang="hu-HU" smtClean="0"/>
+              <a:rPr lang="hu-HU"/>
               <a:t>Mintaszöveg szerkesztése</a:t>
             </a:r>
           </a:p>
           <a:p>
             <a:pPr lvl="1"/>
             <a:r>
-              <a:rPr lang="hu-HU" smtClean="0"/>
+              <a:rPr lang="hu-HU"/>
               <a:t>Második szint</a:t>
             </a:r>
           </a:p>
           <a:p>
             <a:pPr lvl="2"/>
             <a:r>
-              <a:rPr lang="hu-HU" smtClean="0"/>
+              <a:rPr lang="hu-HU"/>
               <a:t>Harmadik szint</a:t>
             </a:r>
           </a:p>
           <a:p>
             <a:pPr lvl="3"/>
             <a:r>
-              <a:rPr lang="hu-HU" smtClean="0"/>
+              <a:rPr lang="hu-HU"/>
               <a:t>Negyedik szint</a:t>
             </a:r>
           </a:p>
           <a:p>
             <a:pPr lvl="4"/>
             <a:r>
-              <a:rPr lang="hu-HU" smtClean="0"/>
+              <a:rPr lang="hu-HU"/>
               <a:t>Ötödik szint</a:t>
             </a:r>
             <a:endParaRPr lang="en-US" dirty="0"/>
@@ -2854,7 +2864,7 @@
           <a:lstStyle/>
           <a:p>
             <a:r>
-              <a:rPr lang="hu-HU" smtClean="0"/>
+              <a:rPr lang="hu-HU"/>
               <a:t>Mintacím szerkesztése</a:t>
             </a:r>
             <a:endParaRPr lang="en-US" dirty="0"/>
@@ -2878,35 +2888,35 @@
           <a:p>
             <a:pPr lvl="0"/>
             <a:r>
-              <a:rPr lang="hu-HU" smtClean="0"/>
+              <a:rPr lang="hu-HU"/>
               <a:t>Mintaszöveg szerkesztése</a:t>
             </a:r>
           </a:p>
           <a:p>
             <a:pPr lvl="1"/>
             <a:r>
-              <a:rPr lang="hu-HU" smtClean="0"/>
+              <a:rPr lang="hu-HU"/>
               <a:t>Második szint</a:t>
             </a:r>
           </a:p>
           <a:p>
             <a:pPr lvl="2"/>
             <a:r>
-              <a:rPr lang="hu-HU" smtClean="0"/>
+              <a:rPr lang="hu-HU"/>
               <a:t>Harmadik szint</a:t>
             </a:r>
           </a:p>
           <a:p>
             <a:pPr lvl="3"/>
             <a:r>
-              <a:rPr lang="hu-HU" smtClean="0"/>
+              <a:rPr lang="hu-HU"/>
               <a:t>Negyedik szint</a:t>
             </a:r>
           </a:p>
           <a:p>
             <a:pPr lvl="4"/>
             <a:r>
-              <a:rPr lang="hu-HU" smtClean="0"/>
+              <a:rPr lang="hu-HU"/>
               <a:t>Ötödik szint</a:t>
             </a:r>
             <a:endParaRPr lang="en-US" dirty="0"/>
@@ -3030,7 +3040,7 @@
           </a:lstStyle>
           <a:p>
             <a:r>
-              <a:rPr lang="hu-HU" smtClean="0"/>
+              <a:rPr lang="hu-HU"/>
               <a:t>Mintacím szerkesztése</a:t>
             </a:r>
             <a:endParaRPr lang="en-US" dirty="0"/>
@@ -3161,7 +3171,7 @@
           <a:p>
             <a:pPr lvl="0"/>
             <a:r>
-              <a:rPr lang="hu-HU" smtClean="0"/>
+              <a:rPr lang="hu-HU"/>
               <a:t>Mintaszöveg szerkesztése</a:t>
             </a:r>
           </a:p>
@@ -3275,7 +3285,7 @@
           <a:lstStyle/>
           <a:p>
             <a:r>
-              <a:rPr lang="hu-HU" smtClean="0"/>
+              <a:rPr lang="hu-HU"/>
               <a:t>Mintacím szerkesztése</a:t>
             </a:r>
             <a:endParaRPr lang="en-US" dirty="0"/>
@@ -3334,35 +3344,35 @@
           <a:p>
             <a:pPr lvl="0"/>
             <a:r>
-              <a:rPr lang="hu-HU" smtClean="0"/>
+              <a:rPr lang="hu-HU"/>
               <a:t>Mintaszöveg szerkesztése</a:t>
             </a:r>
           </a:p>
           <a:p>
             <a:pPr lvl="1"/>
             <a:r>
-              <a:rPr lang="hu-HU" smtClean="0"/>
+              <a:rPr lang="hu-HU"/>
               <a:t>Második szint</a:t>
             </a:r>
           </a:p>
           <a:p>
             <a:pPr lvl="2"/>
             <a:r>
-              <a:rPr lang="hu-HU" smtClean="0"/>
+              <a:rPr lang="hu-HU"/>
               <a:t>Harmadik szint</a:t>
             </a:r>
           </a:p>
           <a:p>
             <a:pPr lvl="3"/>
             <a:r>
-              <a:rPr lang="hu-HU" smtClean="0"/>
+              <a:rPr lang="hu-HU"/>
               <a:t>Negyedik szint</a:t>
             </a:r>
           </a:p>
           <a:p>
             <a:pPr lvl="4"/>
             <a:r>
-              <a:rPr lang="hu-HU" smtClean="0"/>
+              <a:rPr lang="hu-HU"/>
               <a:t>Ötödik szint</a:t>
             </a:r>
             <a:endParaRPr lang="en-US" dirty="0"/>
@@ -3421,35 +3431,35 @@
           <a:p>
             <a:pPr lvl="0"/>
             <a:r>
-              <a:rPr lang="hu-HU" smtClean="0"/>
+              <a:rPr lang="hu-HU"/>
               <a:t>Mintaszöveg szerkesztése</a:t>
             </a:r>
           </a:p>
           <a:p>
             <a:pPr lvl="1"/>
             <a:r>
-              <a:rPr lang="hu-HU" smtClean="0"/>
+              <a:rPr lang="hu-HU"/>
               <a:t>Második szint</a:t>
             </a:r>
           </a:p>
           <a:p>
             <a:pPr lvl="2"/>
             <a:r>
-              <a:rPr lang="hu-HU" smtClean="0"/>
+              <a:rPr lang="hu-HU"/>
               <a:t>Harmadik szint</a:t>
             </a:r>
           </a:p>
           <a:p>
             <a:pPr lvl="3"/>
             <a:r>
-              <a:rPr lang="hu-HU" smtClean="0"/>
+              <a:rPr lang="hu-HU"/>
               <a:t>Negyedik szint</a:t>
             </a:r>
           </a:p>
           <a:p>
             <a:pPr lvl="4"/>
             <a:r>
-              <a:rPr lang="hu-HU" smtClean="0"/>
+              <a:rPr lang="hu-HU"/>
               <a:t>Ötödik szint</a:t>
             </a:r>
             <a:endParaRPr lang="en-US" dirty="0"/>
@@ -3568,7 +3578,7 @@
           </a:lstStyle>
           <a:p>
             <a:r>
-              <a:rPr lang="hu-HU" smtClean="0"/>
+              <a:rPr lang="hu-HU"/>
               <a:t>Mintacím szerkesztése</a:t>
             </a:r>
             <a:endParaRPr lang="en-US" dirty="0"/>
@@ -3636,7 +3646,7 @@
           <a:p>
             <a:pPr lvl="0"/>
             <a:r>
-              <a:rPr lang="hu-HU" smtClean="0"/>
+              <a:rPr lang="hu-HU"/>
               <a:t>Mintaszöveg szerkesztése</a:t>
             </a:r>
           </a:p>
@@ -3694,35 +3704,35 @@
           <a:p>
             <a:pPr lvl="0"/>
             <a:r>
-              <a:rPr lang="hu-HU" smtClean="0"/>
+              <a:rPr lang="hu-HU"/>
               <a:t>Mintaszöveg szerkesztése</a:t>
             </a:r>
           </a:p>
           <a:p>
             <a:pPr lvl="1"/>
             <a:r>
-              <a:rPr lang="hu-HU" smtClean="0"/>
+              <a:rPr lang="hu-HU"/>
               <a:t>Második szint</a:t>
             </a:r>
           </a:p>
           <a:p>
             <a:pPr lvl="2"/>
             <a:r>
-              <a:rPr lang="hu-HU" smtClean="0"/>
+              <a:rPr lang="hu-HU"/>
               <a:t>Harmadik szint</a:t>
             </a:r>
           </a:p>
           <a:p>
             <a:pPr lvl="3"/>
             <a:r>
-              <a:rPr lang="hu-HU" smtClean="0"/>
+              <a:rPr lang="hu-HU"/>
               <a:t>Negyedik szint</a:t>
             </a:r>
           </a:p>
           <a:p>
             <a:pPr lvl="4"/>
             <a:r>
-              <a:rPr lang="hu-HU" smtClean="0"/>
+              <a:rPr lang="hu-HU"/>
               <a:t>Ötödik szint</a:t>
             </a:r>
             <a:endParaRPr lang="en-US" dirty="0"/>
@@ -3790,7 +3800,7 @@
           <a:p>
             <a:pPr lvl="0"/>
             <a:r>
-              <a:rPr lang="hu-HU" smtClean="0"/>
+              <a:rPr lang="hu-HU"/>
               <a:t>Mintaszöveg szerkesztése</a:t>
             </a:r>
           </a:p>
@@ -3848,35 +3858,35 @@
           <a:p>
             <a:pPr lvl="0"/>
             <a:r>
-              <a:rPr lang="hu-HU" smtClean="0"/>
+              <a:rPr lang="hu-HU"/>
               <a:t>Mintaszöveg szerkesztése</a:t>
             </a:r>
           </a:p>
           <a:p>
             <a:pPr lvl="1"/>
             <a:r>
-              <a:rPr lang="hu-HU" smtClean="0"/>
+              <a:rPr lang="hu-HU"/>
               <a:t>Második szint</a:t>
             </a:r>
           </a:p>
           <a:p>
             <a:pPr lvl="2"/>
             <a:r>
-              <a:rPr lang="hu-HU" smtClean="0"/>
+              <a:rPr lang="hu-HU"/>
               <a:t>Harmadik szint</a:t>
             </a:r>
           </a:p>
           <a:p>
             <a:pPr lvl="3"/>
             <a:r>
-              <a:rPr lang="hu-HU" smtClean="0"/>
+              <a:rPr lang="hu-HU"/>
               <a:t>Negyedik szint</a:t>
             </a:r>
           </a:p>
           <a:p>
             <a:pPr lvl="4"/>
             <a:r>
-              <a:rPr lang="hu-HU" smtClean="0"/>
+              <a:rPr lang="hu-HU"/>
               <a:t>Ötödik szint</a:t>
             </a:r>
             <a:endParaRPr lang="en-US" dirty="0"/>
@@ -3991,7 +4001,7 @@
           <a:lstStyle/>
           <a:p>
             <a:r>
-              <a:rPr lang="hu-HU" smtClean="0"/>
+              <a:rPr lang="hu-HU"/>
               <a:t>Mintacím szerkesztése</a:t>
             </a:r>
             <a:endParaRPr lang="en-US" dirty="0"/>
@@ -4209,7 +4219,7 @@
           </a:lstStyle>
           <a:p>
             <a:r>
-              <a:rPr lang="hu-HU" smtClean="0"/>
+              <a:rPr lang="hu-HU"/>
               <a:t>Mintacím szerkesztése</a:t>
             </a:r>
             <a:endParaRPr lang="en-US" dirty="0"/>
@@ -4268,35 +4278,35 @@
           <a:p>
             <a:pPr lvl="0"/>
             <a:r>
-              <a:rPr lang="hu-HU" smtClean="0"/>
+              <a:rPr lang="hu-HU"/>
               <a:t>Mintaszöveg szerkesztése</a:t>
             </a:r>
           </a:p>
           <a:p>
             <a:pPr lvl="1"/>
             <a:r>
-              <a:rPr lang="hu-HU" smtClean="0"/>
+              <a:rPr lang="hu-HU"/>
               <a:t>Második szint</a:t>
             </a:r>
           </a:p>
           <a:p>
             <a:pPr lvl="2"/>
             <a:r>
-              <a:rPr lang="hu-HU" smtClean="0"/>
+              <a:rPr lang="hu-HU"/>
               <a:t>Harmadik szint</a:t>
             </a:r>
           </a:p>
           <a:p>
             <a:pPr lvl="3"/>
             <a:r>
-              <a:rPr lang="hu-HU" smtClean="0"/>
+              <a:rPr lang="hu-HU"/>
               <a:t>Negyedik szint</a:t>
             </a:r>
           </a:p>
           <a:p>
             <a:pPr lvl="4"/>
             <a:r>
-              <a:rPr lang="hu-HU" smtClean="0"/>
+              <a:rPr lang="hu-HU"/>
               <a:t>Ötödik szint</a:t>
             </a:r>
             <a:endParaRPr lang="en-US" dirty="0"/>
@@ -4364,7 +4374,7 @@
           <a:p>
             <a:pPr lvl="0"/>
             <a:r>
-              <a:rPr lang="hu-HU" smtClean="0"/>
+              <a:rPr lang="hu-HU"/>
               <a:t>Mintaszöveg szerkesztése</a:t>
             </a:r>
           </a:p>
@@ -4489,7 +4499,7 @@
           </a:lstStyle>
           <a:p>
             <a:r>
-              <a:rPr lang="hu-HU" smtClean="0"/>
+              <a:rPr lang="hu-HU"/>
               <a:t>Mintacím szerkesztése</a:t>
             </a:r>
             <a:endParaRPr lang="en-US" dirty="0"/>
@@ -4579,7 +4589,7 @@
           </a:lstStyle>
           <a:p>
             <a:r>
-              <a:rPr lang="hu-HU" smtClean="0"/>
+              <a:rPr lang="hu-HU"/>
               <a:t>Kép beszúrásához kattintson az ikonra</a:t>
             </a:r>
             <a:endParaRPr lang="en-US" dirty="0"/>
@@ -4647,7 +4657,7 @@
           <a:p>
             <a:pPr lvl="0"/>
             <a:r>
-              <a:rPr lang="hu-HU" smtClean="0"/>
+              <a:rPr lang="hu-HU"/>
               <a:t>Mintaszöveg szerkesztése</a:t>
             </a:r>
           </a:p>
@@ -4791,7 +4801,7 @@
           <a:lstStyle/>
           <a:p>
             <a:r>
-              <a:rPr lang="hu-HU" smtClean="0"/>
+              <a:rPr lang="hu-HU"/>
               <a:t>Mintacím szerkesztése</a:t>
             </a:r>
             <a:endParaRPr lang="en-US" dirty="0"/>
@@ -4825,35 +4835,35 @@
           <a:p>
             <a:pPr lvl="0"/>
             <a:r>
-              <a:rPr lang="hu-HU" smtClean="0"/>
+              <a:rPr lang="hu-HU"/>
               <a:t>Mintaszöveg szerkesztése</a:t>
             </a:r>
           </a:p>
           <a:p>
             <a:pPr lvl="1"/>
             <a:r>
-              <a:rPr lang="hu-HU" smtClean="0"/>
+              <a:rPr lang="hu-HU"/>
               <a:t>Második szint</a:t>
             </a:r>
           </a:p>
           <a:p>
             <a:pPr lvl="2"/>
             <a:r>
-              <a:rPr lang="hu-HU" smtClean="0"/>
+              <a:rPr lang="hu-HU"/>
               <a:t>Harmadik szint</a:t>
             </a:r>
           </a:p>
           <a:p>
             <a:pPr lvl="3"/>
             <a:r>
-              <a:rPr lang="hu-HU" smtClean="0"/>
+              <a:rPr lang="hu-HU"/>
               <a:t>Negyedik szint</a:t>
             </a:r>
           </a:p>
           <a:p>
             <a:pPr lvl="4"/>
             <a:r>
-              <a:rPr lang="hu-HU" smtClean="0"/>
+              <a:rPr lang="hu-HU"/>
               <a:t>Ötödik szint</a:t>
             </a:r>
             <a:endParaRPr lang="en-US" dirty="0"/>
@@ -5679,20 +5689,87 @@
             <p:ph type="ctrTitle"/>
           </p:nvPr>
         </p:nvSpPr>
-        <p:spPr/>
-        <p:txBody>
-          <a:bodyPr/>
+        <p:spPr>
+          <a:xfrm>
+            <a:off x="1751012" y="2524898"/>
+            <a:ext cx="8676222" cy="856735"/>
+          </a:xfrm>
+        </p:spPr>
+        <p:txBody>
+          <a:bodyPr>
+            <a:normAutofit fontScale="90000"/>
+          </a:bodyPr>
           <a:lstStyle/>
           <a:p>
             <a:r>
               <a:rPr lang="hu-HU" dirty="0"/>
-              <a:t>Etikus </a:t>
+              <a:t>Etikus</a:t>
+            </a:r>
+            <a:r>
+              <a:rPr lang="en-US" dirty="0"/>
+              <a:t> – </a:t>
+            </a:r>
+            <a:r>
+              <a:rPr lang="en-US" dirty="0" err="1"/>
+              <a:t>nem</a:t>
+            </a:r>
+            <a:r>
+              <a:rPr lang="en-US" dirty="0"/>
+              <a:t> </a:t>
+            </a:r>
+            <a:r>
+              <a:rPr lang="en-US" dirty="0" err="1"/>
+              <a:t>etikus</a:t>
+            </a:r>
+            <a:r>
+              <a:rPr lang="hu-HU" dirty="0"/>
+              <a:t> </a:t>
             </a:r>
             <a:r>
               <a:rPr lang="hu-HU" dirty="0" err="1"/>
               <a:t>hackelés</a:t>
             </a:r>
             <a:endParaRPr lang="hu-HU" dirty="0"/>
+          </a:p>
+        </p:txBody>
+      </p:sp>
+      <p:sp>
+        <p:nvSpPr>
+          <p:cNvPr id="3" name="Szövegdoboz 2">
+            <a:extLst>
+              <a:ext uri="{FF2B5EF4-FFF2-40B4-BE49-F238E27FC236}">
+                <a16:creationId xmlns:a16="http://schemas.microsoft.com/office/drawing/2014/main" id="{DDBD5B38-99A0-20C4-7833-A414929C5A4A}"/>
+              </a:ext>
+            </a:extLst>
+          </p:cNvPr>
+          <p:cNvSpPr txBox="1"/>
+          <p:nvPr/>
+        </p:nvSpPr>
+        <p:spPr>
+          <a:xfrm>
+            <a:off x="3650723" y="3587234"/>
+            <a:ext cx="4876800" cy="369332"/>
+          </a:xfrm>
+          <a:prstGeom prst="rect">
+            <a:avLst/>
+          </a:prstGeom>
+          <a:noFill/>
+        </p:spPr>
+        <p:txBody>
+          <a:bodyPr wrap="square" rtlCol="0">
+            <a:spAutoFit/>
+          </a:bodyPr>
+          <a:lstStyle/>
+          <a:p>
+            <a:pPr algn="ctr"/>
+            <a:r>
+              <a:rPr lang="en-US" dirty="0" err="1"/>
+              <a:t>Készítette</a:t>
+            </a:r>
+            <a:r>
+              <a:rPr lang="en-US" dirty="0"/>
+              <a:t>: Dóczi Adrián</a:t>
+            </a:r>
           </a:p>
         </p:txBody>
       </p:sp>
@@ -5700,6 +5777,585 @@
     <p:extLst>
       <p:ext uri="{BB962C8B-B14F-4D97-AF65-F5344CB8AC3E}">
         <p14:creationId xmlns:p14="http://schemas.microsoft.com/office/powerpoint/2010/main" val="1459250692"/>
+      </p:ext>
+    </p:extLst>
+  </p:cSld>
+  <p:clrMapOvr>
+    <a:masterClrMapping/>
+  </p:clrMapOvr>
+</p:sld>
+</file>
+
+<file path=ppt/slides/slide10.xml><?xml version="1.0" encoding="utf-8"?>
+<p:sld xmlns:a="http://schemas.openxmlformats.org/drawingml/2006/main" xmlns:r="http://schemas.openxmlformats.org/officeDocument/2006/relationships" xmlns:p="http://schemas.openxmlformats.org/presentationml/2006/main">
+  <p:cSld>
+    <p:spTree>
+      <p:nvGrpSpPr>
+        <p:cNvPr id="1" name=""/>
+        <p:cNvGrpSpPr/>
+        <p:nvPr/>
+      </p:nvGrpSpPr>
+      <p:grpSpPr>
+        <a:xfrm>
+          <a:off x="0" y="0"/>
+          <a:ext cx="0" cy="0"/>
+          <a:chOff x="0" y="0"/>
+          <a:chExt cx="0" cy="0"/>
+        </a:xfrm>
+      </p:grpSpPr>
+      <p:sp>
+        <p:nvSpPr>
+          <p:cNvPr id="2" name="Cím 1">
+            <a:extLst>
+              <a:ext uri="{FF2B5EF4-FFF2-40B4-BE49-F238E27FC236}">
+                <a16:creationId xmlns:a16="http://schemas.microsoft.com/office/drawing/2014/main" id="{7626F3C5-D2CA-5283-B71C-C3A567C9D8BD}"/>
+              </a:ext>
+            </a:extLst>
+          </p:cNvPr>
+          <p:cNvSpPr>
+            <a:spLocks noGrp="1"/>
+          </p:cNvSpPr>
+          <p:nvPr>
+            <p:ph type="title"/>
+          </p:nvPr>
+        </p:nvSpPr>
+        <p:spPr>
+          <a:xfrm>
+            <a:off x="1141413" y="0"/>
+            <a:ext cx="9905998" cy="1193800"/>
+          </a:xfrm>
+        </p:spPr>
+        <p:txBody>
+          <a:bodyPr/>
+          <a:lstStyle/>
+          <a:p>
+            <a:pPr algn="ctr"/>
+            <a:r>
+              <a:rPr lang="en-US" dirty="0" err="1"/>
+              <a:t>Keyloggerek</a:t>
+            </a:r>
+            <a:endParaRPr lang="en-US" dirty="0"/>
+          </a:p>
+        </p:txBody>
+      </p:sp>
+      <p:sp>
+        <p:nvSpPr>
+          <p:cNvPr id="3" name="Tartalom helye 2">
+            <a:extLst>
+              <a:ext uri="{FF2B5EF4-FFF2-40B4-BE49-F238E27FC236}">
+                <a16:creationId xmlns:a16="http://schemas.microsoft.com/office/drawing/2014/main" id="{968995ED-1392-9643-2228-16D80C0A550F}"/>
+              </a:ext>
+            </a:extLst>
+          </p:cNvPr>
+          <p:cNvSpPr>
+            <a:spLocks noGrp="1"/>
+          </p:cNvSpPr>
+          <p:nvPr>
+            <p:ph idx="1"/>
+          </p:nvPr>
+        </p:nvSpPr>
+        <p:spPr>
+          <a:xfrm>
+            <a:off x="392112" y="1073150"/>
+            <a:ext cx="11228387" cy="2146300"/>
+          </a:xfrm>
+        </p:spPr>
+        <p:txBody>
+          <a:bodyPr>
+            <a:normAutofit/>
+          </a:bodyPr>
+          <a:lstStyle/>
+          <a:p>
+            <a:r>
+              <a:rPr lang="hu-HU" dirty="0"/>
+              <a:t>billentyűleütés naplózása</a:t>
+            </a:r>
+            <a:endParaRPr lang="en-US" dirty="0"/>
+          </a:p>
+          <a:p>
+            <a:r>
+              <a:rPr lang="en-US" dirty="0" err="1"/>
+              <a:t>Felhasználói</a:t>
+            </a:r>
+            <a:r>
+              <a:rPr lang="en-US" dirty="0"/>
+              <a:t> </a:t>
+            </a:r>
+            <a:r>
+              <a:rPr lang="en-US" dirty="0" err="1"/>
+              <a:t>adatok</a:t>
+            </a:r>
+            <a:r>
+              <a:rPr lang="en-US" dirty="0"/>
+              <a:t> </a:t>
+            </a:r>
+            <a:r>
+              <a:rPr lang="en-US" dirty="0" err="1"/>
+              <a:t>lopása</a:t>
+            </a:r>
+            <a:endParaRPr lang="en-US" dirty="0"/>
+          </a:p>
+          <a:p>
+            <a:r>
+              <a:rPr lang="en-US" dirty="0" err="1"/>
+              <a:t>Könnyen</a:t>
+            </a:r>
+            <a:r>
+              <a:rPr lang="en-US" dirty="0"/>
+              <a:t> </a:t>
+            </a:r>
+            <a:r>
+              <a:rPr lang="en-US" dirty="0" err="1"/>
+              <a:t>elkészíthető</a:t>
+            </a:r>
+            <a:r>
+              <a:rPr lang="en-US" dirty="0"/>
+              <a:t> (python, </a:t>
+            </a:r>
+            <a:r>
+              <a:rPr lang="en-US" dirty="0" err="1"/>
+              <a:t>js</a:t>
+            </a:r>
+            <a:r>
+              <a:rPr lang="en-US" dirty="0"/>
+              <a:t> </a:t>
+            </a:r>
+            <a:r>
+              <a:rPr lang="en-US" dirty="0" err="1"/>
+              <a:t>szerver</a:t>
+            </a:r>
+            <a:r>
+              <a:rPr lang="en-US" dirty="0"/>
+              <a:t> – </a:t>
+            </a:r>
+            <a:r>
+              <a:rPr lang="en-US" dirty="0" err="1"/>
+              <a:t>naplózza</a:t>
+            </a:r>
+            <a:r>
+              <a:rPr lang="en-US" dirty="0"/>
+              <a:t> </a:t>
+            </a:r>
+            <a:r>
+              <a:rPr lang="en-US" dirty="0" err="1"/>
+              <a:t>az</a:t>
+            </a:r>
+            <a:r>
+              <a:rPr lang="en-US" dirty="0"/>
+              <a:t> </a:t>
+            </a:r>
+            <a:r>
+              <a:rPr lang="en-US" dirty="0" err="1"/>
+              <a:t>adatokat</a:t>
+            </a:r>
+            <a:r>
+              <a:rPr lang="en-US" dirty="0"/>
+              <a:t>)</a:t>
+            </a:r>
+          </a:p>
+          <a:p>
+            <a:r>
+              <a:rPr lang="en-US" dirty="0" err="1"/>
+              <a:t>Nehezen</a:t>
+            </a:r>
+            <a:r>
+              <a:rPr lang="en-US" dirty="0"/>
+              <a:t> </a:t>
+            </a:r>
+            <a:r>
+              <a:rPr lang="en-US" dirty="0" err="1"/>
+              <a:t>észlelhető</a:t>
+            </a:r>
+            <a:endParaRPr lang="en-US" dirty="0"/>
+          </a:p>
+        </p:txBody>
+      </p:sp>
+      <p:pic>
+        <p:nvPicPr>
+          <p:cNvPr id="4" name="Kép 3">
+            <a:extLst>
+              <a:ext uri="{FF2B5EF4-FFF2-40B4-BE49-F238E27FC236}">
+                <a16:creationId xmlns:a16="http://schemas.microsoft.com/office/drawing/2014/main" id="{684659F3-BB72-BDBF-EDCC-9A96363FD256}"/>
+              </a:ext>
+            </a:extLst>
+          </p:cNvPr>
+          <p:cNvPicPr>
+            <a:picLocks noChangeAspect="1"/>
+          </p:cNvPicPr>
+          <p:nvPr/>
+        </p:nvPicPr>
+        <p:blipFill>
+          <a:blip r:embed="rId2"/>
+          <a:stretch>
+            <a:fillRect/>
+          </a:stretch>
+        </p:blipFill>
+        <p:spPr>
+          <a:xfrm>
+            <a:off x="10135783" y="356808"/>
+            <a:ext cx="1484716" cy="1626911"/>
+          </a:xfrm>
+          <a:prstGeom prst="rect">
+            <a:avLst/>
+          </a:prstGeom>
+        </p:spPr>
+      </p:pic>
+      <p:pic>
+        <p:nvPicPr>
+          <p:cNvPr id="6" name="Kép 5">
+            <a:extLst>
+              <a:ext uri="{FF2B5EF4-FFF2-40B4-BE49-F238E27FC236}">
+                <a16:creationId xmlns:a16="http://schemas.microsoft.com/office/drawing/2014/main" id="{4C3637A4-1119-03FC-91DA-74DF506AACB3}"/>
+              </a:ext>
+            </a:extLst>
+          </p:cNvPr>
+          <p:cNvPicPr>
+            <a:picLocks noChangeAspect="1"/>
+          </p:cNvPicPr>
+          <p:nvPr/>
+        </p:nvPicPr>
+        <p:blipFill>
+          <a:blip r:embed="rId3"/>
+          <a:stretch>
+            <a:fillRect/>
+          </a:stretch>
+        </p:blipFill>
+        <p:spPr>
+          <a:xfrm>
+            <a:off x="4450536" y="2832062"/>
+            <a:ext cx="3594138" cy="3594138"/>
+          </a:xfrm>
+          <a:prstGeom prst="rect">
+            <a:avLst/>
+          </a:prstGeom>
+        </p:spPr>
+      </p:pic>
+    </p:spTree>
+    <p:extLst>
+      <p:ext uri="{BB962C8B-B14F-4D97-AF65-F5344CB8AC3E}">
+        <p14:creationId xmlns:p14="http://schemas.microsoft.com/office/powerpoint/2010/main" val="1785293174"/>
+      </p:ext>
+    </p:extLst>
+  </p:cSld>
+  <p:clrMapOvr>
+    <a:masterClrMapping/>
+  </p:clrMapOvr>
+  <p:timing>
+    <p:tnLst>
+      <p:par>
+        <p:cTn id="1" dur="indefinite" restart="never" nodeType="tmRoot">
+          <p:childTnLst>
+            <p:seq concurrent="1" nextAc="seek">
+              <p:cTn id="2" dur="indefinite" nodeType="mainSeq">
+                <p:childTnLst>
+                  <p:par>
+                    <p:cTn id="3" fill="hold">
+                      <p:stCondLst>
+                        <p:cond delay="indefinite"/>
+                        <p:cond evt="onBegin" delay="0">
+                          <p:tn val="2"/>
+                        </p:cond>
+                      </p:stCondLst>
+                      <p:childTnLst>
+                        <p:par>
+                          <p:cTn id="4" fill="hold">
+                            <p:stCondLst>
+                              <p:cond delay="0"/>
+                            </p:stCondLst>
+                            <p:childTnLst>
+                              <p:par>
+                                <p:cTn id="5" presetID="1" presetClass="entr" presetSubtype="0" fill="hold" nodeType="afterEffect">
+                                  <p:stCondLst>
+                                    <p:cond delay="500"/>
+                                  </p:stCondLst>
+                                  <p:childTnLst>
+                                    <p:set>
+                                      <p:cBhvr>
+                                        <p:cTn id="6" dur="1" fill="hold">
+                                          <p:stCondLst>
+                                            <p:cond delay="0"/>
+                                          </p:stCondLst>
+                                        </p:cTn>
+                                        <p:tgtEl>
+                                          <p:spTgt spid="4"/>
+                                        </p:tgtEl>
+                                        <p:attrNameLst>
+                                          <p:attrName>style.visibility</p:attrName>
+                                        </p:attrNameLst>
+                                      </p:cBhvr>
+                                      <p:to>
+                                        <p:strVal val="visible"/>
+                                      </p:to>
+                                    </p:set>
+                                  </p:childTnLst>
+                                </p:cTn>
+                              </p:par>
+                            </p:childTnLst>
+                          </p:cTn>
+                        </p:par>
+                      </p:childTnLst>
+                    </p:cTn>
+                  </p:par>
+                </p:childTnLst>
+              </p:cTn>
+              <p:prevCondLst>
+                <p:cond evt="onPrev" delay="0">
+                  <p:tgtEl>
+                    <p:sldTgt/>
+                  </p:tgtEl>
+                </p:cond>
+              </p:prevCondLst>
+              <p:nextCondLst>
+                <p:cond evt="onNext" delay="0">
+                  <p:tgtEl>
+                    <p:sldTgt/>
+                  </p:tgtEl>
+                </p:cond>
+              </p:nextCondLst>
+            </p:seq>
+          </p:childTnLst>
+        </p:cTn>
+      </p:par>
+    </p:tnLst>
+  </p:timing>
+</p:sld>
+</file>
+
+<file path=ppt/slides/slide11.xml><?xml version="1.0" encoding="utf-8"?>
+<p:sld xmlns:a="http://schemas.openxmlformats.org/drawingml/2006/main" xmlns:r="http://schemas.openxmlformats.org/officeDocument/2006/relationships" xmlns:p="http://schemas.openxmlformats.org/presentationml/2006/main">
+  <p:cSld>
+    <p:spTree>
+      <p:nvGrpSpPr>
+        <p:cNvPr id="1" name=""/>
+        <p:cNvGrpSpPr/>
+        <p:nvPr/>
+      </p:nvGrpSpPr>
+      <p:grpSpPr>
+        <a:xfrm>
+          <a:off x="0" y="0"/>
+          <a:ext cx="0" cy="0"/>
+          <a:chOff x="0" y="0"/>
+          <a:chExt cx="0" cy="0"/>
+        </a:xfrm>
+      </p:grpSpPr>
+      <p:sp>
+        <p:nvSpPr>
+          <p:cNvPr id="2" name="Cím 1"/>
+          <p:cNvSpPr>
+            <a:spLocks noGrp="1"/>
+          </p:cNvSpPr>
+          <p:nvPr>
+            <p:ph type="title"/>
+          </p:nvPr>
+        </p:nvSpPr>
+        <p:spPr>
+          <a:xfrm>
+            <a:off x="1141413" y="0"/>
+            <a:ext cx="9905998" cy="1905000"/>
+          </a:xfrm>
+        </p:spPr>
+        <p:txBody>
+          <a:bodyPr/>
+          <a:lstStyle/>
+          <a:p>
+            <a:pPr algn="ctr"/>
+            <a:r>
+              <a:rPr lang="hu-HU" dirty="0"/>
+              <a:t>Források</a:t>
+            </a:r>
+          </a:p>
+        </p:txBody>
+      </p:sp>
+      <p:sp>
+        <p:nvSpPr>
+          <p:cNvPr id="3" name="Tartalom helye 2"/>
+          <p:cNvSpPr>
+            <a:spLocks noGrp="1"/>
+          </p:cNvSpPr>
+          <p:nvPr>
+            <p:ph idx="1"/>
+          </p:nvPr>
+        </p:nvSpPr>
+        <p:spPr>
+          <a:xfrm>
+            <a:off x="234156" y="1574799"/>
+            <a:ext cx="11723687" cy="5283201"/>
+          </a:xfrm>
+        </p:spPr>
+        <p:txBody>
+          <a:bodyPr>
+            <a:normAutofit fontScale="40000" lnSpcReduction="20000"/>
+          </a:bodyPr>
+          <a:lstStyle/>
+          <a:p>
+            <a:pPr marL="0" indent="0">
+              <a:buNone/>
+            </a:pPr>
+            <a:r>
+              <a:rPr lang="hu-HU" sz="4200" dirty="0">
+                <a:hlinkClick r:id="rId2"/>
+              </a:rPr>
+              <a:t>https://blog.crosssec.com/mi-az-az-etikus-hackeles-es-miert-fontos</a:t>
+            </a:r>
+            <a:endParaRPr lang="en-US" sz="4200" dirty="0"/>
+          </a:p>
+          <a:p>
+            <a:pPr marL="0" indent="0">
+              <a:buNone/>
+            </a:pPr>
+            <a:r>
+              <a:rPr lang="hu-HU" sz="4200" dirty="0">
+                <a:hlinkClick r:id="rId3"/>
+              </a:rPr>
+              <a:t>https://www.wikiwand.com/hu/Brute_force-t%C3%A1mad%C3%A1s</a:t>
+            </a:r>
+            <a:endParaRPr lang="en-US" sz="4200" dirty="0"/>
+          </a:p>
+          <a:p>
+            <a:pPr marL="0" indent="0">
+              <a:buNone/>
+            </a:pPr>
+            <a:r>
+              <a:rPr lang="en-US" sz="4200" dirty="0">
+                <a:hlinkClick r:id="rId4"/>
+              </a:rPr>
+              <a:t>http://dynamicart.hu/blog/keylogger-kemprogram-ismerteto</a:t>
+            </a:r>
+            <a:endParaRPr lang="en-US" sz="4200" dirty="0"/>
+          </a:p>
+          <a:p>
+            <a:pPr marL="0" indent="0">
+              <a:buNone/>
+            </a:pPr>
+            <a:r>
+              <a:rPr lang="en-US" sz="4200" dirty="0">
+                <a:hlinkClick r:id="rId5"/>
+              </a:rPr>
+              <a:t>https://www.simplilearn.com/top-5-ethical-hacking-tools-rar313-article</a:t>
+            </a:r>
+            <a:endParaRPr lang="en-US" sz="4200" dirty="0"/>
+          </a:p>
+          <a:p>
+            <a:pPr marL="0" indent="0">
+              <a:buNone/>
+            </a:pPr>
+            <a:r>
+              <a:rPr lang="en-US" sz="4200" dirty="0">
+                <a:hlinkClick r:id="rId6"/>
+              </a:rPr>
+              <a:t>https://bizuns.com/default-passwords-list</a:t>
+            </a:r>
+            <a:endParaRPr lang="en-US" sz="4200" dirty="0"/>
+          </a:p>
+          <a:p>
+            <a:pPr marL="0" indent="0">
+              <a:buNone/>
+            </a:pPr>
+            <a:endParaRPr lang="en-US" sz="4200" dirty="0"/>
+          </a:p>
+          <a:p>
+            <a:pPr marL="0" indent="0">
+              <a:buNone/>
+            </a:pPr>
+            <a:endParaRPr lang="en-US" sz="2900" dirty="0"/>
+          </a:p>
+          <a:p>
+            <a:pPr marL="0" indent="0">
+              <a:buNone/>
+            </a:pPr>
+            <a:endParaRPr lang="hu-HU" sz="2900" dirty="0"/>
+          </a:p>
+          <a:p>
+            <a:pPr marL="0" indent="0">
+              <a:buNone/>
+            </a:pPr>
+            <a:r>
+              <a:rPr lang="en-US" sz="3800" dirty="0" err="1"/>
+              <a:t>Képek</a:t>
+            </a:r>
+            <a:r>
+              <a:rPr lang="en-US" sz="3800" dirty="0"/>
+              <a:t>:</a:t>
+            </a:r>
+          </a:p>
+          <a:p>
+            <a:pPr marL="0" indent="0">
+              <a:buNone/>
+            </a:pPr>
+            <a:r>
+              <a:rPr lang="hu-HU" sz="4600" dirty="0">
+                <a:hlinkClick r:id="rId7"/>
+              </a:rPr>
+              <a:t>https://upload.wikimedia.org/wikipedia/commons/thumb/b/bd/Board300.jpg/640px-Board300.jpg</a:t>
+            </a:r>
+            <a:endParaRPr lang="en-US" sz="4600" dirty="0"/>
+          </a:p>
+          <a:p>
+            <a:pPr marL="0" indent="0">
+              <a:buNone/>
+            </a:pPr>
+            <a:r>
+              <a:rPr lang="hu-HU" sz="4600" dirty="0">
+                <a:hlinkClick r:id="rId8"/>
+              </a:rPr>
+              <a:t>https://unix.stackexchange.com/questions/622807/kali-linux-2020-2-stuck-on-dragon-logo</a:t>
+            </a:r>
+            <a:endParaRPr lang="en-US" sz="4600" dirty="0"/>
+          </a:p>
+          <a:p>
+            <a:pPr marL="0" indent="0">
+              <a:buNone/>
+            </a:pPr>
+            <a:r>
+              <a:rPr lang="hu-HU" sz="4600" dirty="0">
+                <a:hlinkClick r:id="rId9"/>
+              </a:rPr>
+              <a:t>https://commons.wikimedia.org/wiki/File:Beef_project_logo.png</a:t>
+            </a:r>
+            <a:endParaRPr lang="en-US" sz="4600" dirty="0"/>
+          </a:p>
+          <a:p>
+            <a:pPr marL="0" indent="0">
+              <a:buNone/>
+            </a:pPr>
+            <a:r>
+              <a:rPr lang="en-US" sz="4600" dirty="0">
+                <a:hlinkClick r:id="rId10"/>
+              </a:rPr>
+              <a:t>https://medium.com/@Hirushan96/exploiting-vulnerabilities-90c416047c35</a:t>
+            </a:r>
+            <a:endParaRPr lang="en-US" sz="4600" dirty="0"/>
+          </a:p>
+          <a:p>
+            <a:pPr marL="0" indent="0">
+              <a:buNone/>
+            </a:pPr>
+            <a:r>
+              <a:rPr lang="en-US" sz="4600" dirty="0">
+                <a:hlinkClick r:id="rId11"/>
+              </a:rPr>
+              <a:t>https://requestbin.net/post/top-wordlists-for-brute-force-attack</a:t>
+            </a:r>
+            <a:endParaRPr lang="en-US" sz="4600" dirty="0"/>
+          </a:p>
+          <a:p>
+            <a:pPr marL="0" indent="0">
+              <a:buNone/>
+            </a:pPr>
+            <a:endParaRPr lang="en-US" dirty="0"/>
+          </a:p>
+          <a:p>
+            <a:pPr marL="0" indent="0">
+              <a:buNone/>
+            </a:pPr>
+            <a:endParaRPr lang="en-US" dirty="0"/>
+          </a:p>
+        </p:txBody>
+      </p:sp>
+    </p:spTree>
+    <p:extLst>
+      <p:ext uri="{BB962C8B-B14F-4D97-AF65-F5344CB8AC3E}">
+        <p14:creationId xmlns:p14="http://schemas.microsoft.com/office/powerpoint/2010/main" val="1677235996"/>
       </p:ext>
     </p:extLst>
   </p:cSld>
@@ -5738,7 +6394,7 @@
         </p:nvSpPr>
         <p:spPr>
           <a:xfrm>
-            <a:off x="608013" y="50800"/>
+            <a:off x="481013" y="0"/>
             <a:ext cx="9905998" cy="1905000"/>
           </a:xfrm>
         </p:spPr>
@@ -5773,7 +6429,7 @@
         </p:nvSpPr>
         <p:spPr>
           <a:xfrm>
-            <a:off x="608013" y="1003300"/>
+            <a:off x="481013" y="787400"/>
             <a:ext cx="9905998" cy="3124201"/>
           </a:xfrm>
         </p:spPr>
@@ -5803,21 +6459,8 @@
           <a:p>
             <a:r>
               <a:rPr lang="hu-HU" sz="2400" b="1" dirty="0"/>
-              <a:t>még a legnagyobb </a:t>
-            </a:r>
-            <a:r>
-              <a:rPr lang="hu-HU" sz="2400" b="1" dirty="0" smtClean="0"/>
-              <a:t>cégeknél is </a:t>
-            </a:r>
-            <a:r>
-              <a:rPr lang="hu-HU" sz="2400" b="1" dirty="0"/>
-              <a:t>szükség van </a:t>
-            </a:r>
-            <a:r>
-              <a:rPr lang="hu-HU" sz="2400" b="1" dirty="0" smtClean="0"/>
-              <a:t>rá</a:t>
-            </a:r>
-            <a:endParaRPr lang="hu-HU" sz="2400" b="1" dirty="0"/>
+              <a:t>még a legnagyobb cégeknél is szükség van rá</a:t>
+            </a:r>
           </a:p>
         </p:txBody>
       </p:sp>
@@ -5843,7 +6486,7 @@
         </p:blipFill>
         <p:spPr>
           <a:xfrm>
-            <a:off x="3064879" y="3746500"/>
+            <a:off x="3599867" y="3911601"/>
             <a:ext cx="4992266" cy="2616200"/>
           </a:xfrm>
           <a:prstGeom prst="rect">
@@ -5903,10 +6546,9 @@
           <a:p>
             <a:pPr algn="ctr"/>
             <a:r>
-              <a:rPr lang="hu-HU" dirty="0" smtClean="0"/>
+              <a:rPr lang="hu-HU" dirty="0"/>
               <a:t>Eszközök használata</a:t>
             </a:r>
-            <a:endParaRPr lang="hu-HU" dirty="0"/>
           </a:p>
         </p:txBody>
       </p:sp>
@@ -5937,7 +6579,7 @@
                 <a:spcPct val="220000"/>
               </a:lnSpc>
             </a:pPr>
-            <a:endParaRPr lang="hu-HU" sz="1400" b="1" dirty="0" smtClean="0">
+            <a:endParaRPr lang="hu-HU" sz="1400" b="1" dirty="0">
               <a:effectLst/>
             </a:endParaRPr>
           </a:p>
@@ -5948,12 +6590,12 @@
               </a:lnSpc>
             </a:pPr>
             <a:r>
-              <a:rPr lang="hu-HU" b="1" dirty="0" err="1" smtClean="0">
+              <a:rPr lang="hu-HU" b="1" dirty="0" err="1">
                 <a:effectLst/>
               </a:rPr>
               <a:t>Wireshark</a:t>
             </a:r>
-            <a:endParaRPr lang="hu-HU" b="1" dirty="0" smtClean="0">
+            <a:endParaRPr lang="hu-HU" b="1" dirty="0">
               <a:effectLst/>
             </a:endParaRPr>
           </a:p>
@@ -5964,7 +6606,7 @@
               </a:lnSpc>
               <a:buNone/>
             </a:pPr>
-            <a:endParaRPr lang="hu-HU" b="1" dirty="0" smtClean="0">
+            <a:endParaRPr lang="hu-HU" b="1" dirty="0">
               <a:effectLst/>
             </a:endParaRPr>
           </a:p>
@@ -5975,12 +6617,12 @@
               </a:lnSpc>
             </a:pPr>
             <a:r>
-              <a:rPr lang="hu-HU" b="1" dirty="0" err="1" smtClean="0">
+              <a:rPr lang="hu-HU" b="1" dirty="0" err="1">
                 <a:effectLst/>
               </a:rPr>
               <a:t>Sqlmap</a:t>
             </a:r>
-            <a:endParaRPr lang="hu-HU" b="1" dirty="0" smtClean="0">
+            <a:endParaRPr lang="hu-HU" b="1" dirty="0">
               <a:effectLst/>
             </a:endParaRPr>
           </a:p>
@@ -5991,7 +6633,7 @@
               </a:lnSpc>
               <a:buNone/>
             </a:pPr>
-            <a:endParaRPr lang="hu-HU" b="1" dirty="0" smtClean="0">
+            <a:endParaRPr lang="hu-HU" b="1" dirty="0">
               <a:effectLst/>
             </a:endParaRPr>
           </a:p>
@@ -6002,19 +6644,19 @@
               </a:lnSpc>
             </a:pPr>
             <a:r>
-              <a:rPr lang="hu-HU" b="1" dirty="0" err="1" smtClean="0">
+              <a:rPr lang="hu-HU" b="1" dirty="0" err="1">
                 <a:effectLst/>
               </a:rPr>
               <a:t>Burp</a:t>
             </a:r>
             <a:r>
-              <a:rPr lang="hu-HU" b="1" dirty="0" smtClean="0">
+              <a:rPr lang="hu-HU" b="1" dirty="0">
                 <a:effectLst/>
               </a:rPr>
               <a:t> </a:t>
             </a:r>
             <a:r>
-              <a:rPr lang="hu-HU" b="1" dirty="0" err="1" smtClean="0">
+              <a:rPr lang="hu-HU" b="1" dirty="0" err="1">
                 <a:effectLst/>
               </a:rPr>
               <a:t>Suite</a:t>
@@ -6137,13 +6779,8 @@
           <a:p>
             <a:r>
               <a:rPr lang="hu-HU" dirty="0"/>
-              <a:t>nyílt forráskódú </a:t>
-            </a:r>
-            <a:r>
-              <a:rPr lang="hu-HU" dirty="0" smtClean="0"/>
-              <a:t>csomagelemző, hibaelhárítás</a:t>
-            </a:r>
-            <a:endParaRPr lang="hu-HU" dirty="0"/>
+              <a:t>nyílt forráskódú csomagelemző, hibaelhárítás</a:t>
+            </a:r>
           </a:p>
         </p:txBody>
       </p:sp>
@@ -6170,18 +6807,17 @@
           <a:lstStyle/>
           <a:p>
             <a:r>
-              <a:rPr lang="hu-HU" dirty="0" smtClean="0"/>
+              <a:rPr lang="hu-HU" dirty="0"/>
               <a:t>SQL </a:t>
             </a:r>
             <a:r>
-              <a:rPr lang="hu-HU" dirty="0" err="1" smtClean="0"/>
+              <a:rPr lang="hu-HU" dirty="0" err="1"/>
               <a:t>Injection</a:t>
             </a:r>
             <a:r>
-              <a:rPr lang="hu-HU" dirty="0" smtClean="0"/>
+              <a:rPr lang="hu-HU" dirty="0"/>
               <a:t> elhárítására szolgál</a:t>
             </a:r>
-            <a:endParaRPr lang="hu-HU" dirty="0"/>
           </a:p>
         </p:txBody>
       </p:sp>
@@ -6208,10 +6844,9 @@
           <a:lstStyle/>
           <a:p>
             <a:r>
-              <a:rPr lang="hu-HU" dirty="0" smtClean="0"/>
+              <a:rPr lang="hu-HU" dirty="0"/>
               <a:t>webbiztonsági tesztek</a:t>
             </a:r>
-            <a:endParaRPr lang="hu-HU" dirty="0"/>
           </a:p>
         </p:txBody>
       </p:sp>
@@ -6247,7 +6882,13 @@
       </p:grpSpPr>
       <p:sp>
         <p:nvSpPr>
-          <p:cNvPr id="2" name="Cím 1"/>
+          <p:cNvPr id="2" name="Cím 1">
+            <a:extLst>
+              <a:ext uri="{FF2B5EF4-FFF2-40B4-BE49-F238E27FC236}">
+                <a16:creationId xmlns:a16="http://schemas.microsoft.com/office/drawing/2014/main" id="{3D78DA37-D922-2D33-44E8-02DCD97F4F31}"/>
+              </a:ext>
+            </a:extLst>
+          </p:cNvPr>
           <p:cNvSpPr>
             <a:spLocks noGrp="1"/>
           </p:cNvSpPr>
@@ -6257,8 +6898,8 @@
         </p:nvSpPr>
         <p:spPr>
           <a:xfrm>
-            <a:off x="1141413" y="0"/>
-            <a:ext cx="9905998" cy="1765300"/>
+            <a:off x="1141413" y="190500"/>
+            <a:ext cx="9905998" cy="1447800"/>
           </a:xfrm>
         </p:spPr>
         <p:txBody>
@@ -6267,16 +6908,30 @@
           <a:p>
             <a:pPr algn="ctr"/>
             <a:r>
-              <a:rPr lang="hu-HU" dirty="0" smtClean="0"/>
-              <a:t>Miért van szükség rájuk?</a:t>
-            </a:r>
-            <a:endParaRPr lang="hu-HU" dirty="0"/>
-          </a:p>
-        </p:txBody>
-      </p:sp>
-      <p:sp>
-        <p:nvSpPr>
-          <p:cNvPr id="3" name="Tartalom helye 2"/>
+              <a:rPr lang="en-US" dirty="0" err="1"/>
+              <a:t>Egyéb</a:t>
+            </a:r>
+            <a:r>
+              <a:rPr lang="en-US" dirty="0"/>
+              <a:t> </a:t>
+            </a:r>
+            <a:r>
+              <a:rPr lang="en-US" dirty="0" err="1"/>
+              <a:t>programok</a:t>
+            </a:r>
+            <a:endParaRPr lang="en-US" dirty="0"/>
+          </a:p>
+        </p:txBody>
+      </p:sp>
+      <p:sp>
+        <p:nvSpPr>
+          <p:cNvPr id="3" name="Tartalom helye 2">
+            <a:extLst>
+              <a:ext uri="{FF2B5EF4-FFF2-40B4-BE49-F238E27FC236}">
+                <a16:creationId xmlns:a16="http://schemas.microsoft.com/office/drawing/2014/main" id="{2D5BE06C-23A6-D757-A966-952CD22C67C2}"/>
+              </a:ext>
+            </a:extLst>
+          </p:cNvPr>
           <p:cNvSpPr>
             <a:spLocks noGrp="1"/>
           </p:cNvSpPr>
@@ -6286,7 +6941,7 @@
         </p:nvSpPr>
         <p:spPr>
           <a:xfrm>
-            <a:off x="531813" y="882650"/>
+            <a:off x="481013" y="711199"/>
             <a:ext cx="9905998" cy="3124201"/>
           </a:xfrm>
         </p:spPr>
@@ -6294,56 +6949,300 @@
           <a:bodyPr/>
           <a:lstStyle/>
           <a:p>
-            <a:pPr marL="0" indent="0">
-              <a:buNone/>
+            <a:r>
+              <a:rPr lang="en-US" dirty="0"/>
+              <a:t>NMAP – </a:t>
+            </a:r>
+            <a:r>
+              <a:rPr lang="en-US" dirty="0" err="1"/>
+              <a:t>hálózati</a:t>
+            </a:r>
+            <a:r>
+              <a:rPr lang="en-US" dirty="0"/>
+              <a:t> </a:t>
+            </a:r>
+            <a:r>
+              <a:rPr lang="en-US" dirty="0" err="1"/>
+              <a:t>szkenner</a:t>
+            </a:r>
+            <a:r>
+              <a:rPr lang="en-US" dirty="0"/>
+              <a:t> (network mapper)</a:t>
+            </a:r>
+          </a:p>
+          <a:p>
+            <a:r>
+              <a:rPr lang="en-US" dirty="0"/>
+              <a:t>NIKTO – </a:t>
+            </a:r>
+            <a:r>
+              <a:rPr lang="en-US" dirty="0" err="1"/>
+              <a:t>sebezhetőség-leolvasó</a:t>
+            </a:r>
+            <a:r>
+              <a:rPr lang="en-US" dirty="0"/>
+              <a:t> </a:t>
+            </a:r>
+            <a:r>
+              <a:rPr lang="en-US" b="0" i="0" dirty="0" err="1">
+                <a:solidFill>
+                  <a:srgbClr val="BDC1C6"/>
+                </a:solidFill>
+                <a:effectLst/>
+                <a:latin typeface="arial" panose="020B0604020202020204" pitchFamily="34" charset="0"/>
+              </a:rPr>
+              <a:t>webszervereken</a:t>
+            </a:r>
+            <a:endParaRPr lang="en-US" b="0" i="0" dirty="0">
+              <a:solidFill>
+                <a:srgbClr val="BDC1C6"/>
+              </a:solidFill>
+              <a:effectLst/>
+              <a:latin typeface="arial" panose="020B0604020202020204" pitchFamily="34" charset="0"/>
+            </a:endParaRPr>
+          </a:p>
+          <a:p>
+            <a:r>
+              <a:rPr lang="en-US" dirty="0">
+                <a:solidFill>
+                  <a:srgbClr val="BDC1C6"/>
+                </a:solidFill>
+                <a:effectLst/>
+                <a:latin typeface="arial" panose="020B0604020202020204" pitchFamily="34" charset="0"/>
+              </a:rPr>
+              <a:t>METASPLOIT – </a:t>
+            </a:r>
+            <a:r>
+              <a:rPr lang="en-US" b="0" i="0" dirty="0" err="1">
+                <a:solidFill>
+                  <a:srgbClr val="BDC1C6"/>
+                </a:solidFill>
+                <a:effectLst/>
+                <a:latin typeface="arial" panose="020B0604020202020204" pitchFamily="34" charset="0"/>
+              </a:rPr>
+              <a:t>segíti</a:t>
+            </a:r>
+            <a:r>
+              <a:rPr lang="en-US" b="0" i="0" dirty="0">
+                <a:solidFill>
+                  <a:srgbClr val="BDC1C6"/>
+                </a:solidFill>
+                <a:effectLst/>
+                <a:latin typeface="arial" panose="020B0604020202020204" pitchFamily="34" charset="0"/>
+              </a:rPr>
+              <a:t> a </a:t>
+            </a:r>
+            <a:r>
+              <a:rPr lang="en-US" b="0" i="0" dirty="0" err="1">
+                <a:solidFill>
+                  <a:srgbClr val="BDC1C6"/>
+                </a:solidFill>
+                <a:effectLst/>
+                <a:latin typeface="arial" panose="020B0604020202020204" pitchFamily="34" charset="0"/>
+              </a:rPr>
+              <a:t>betörési</a:t>
+            </a:r>
+            <a:r>
+              <a:rPr lang="en-US" b="0" i="0" dirty="0">
+                <a:solidFill>
+                  <a:srgbClr val="BDC1C6"/>
+                </a:solidFill>
+                <a:effectLst/>
+                <a:latin typeface="arial" panose="020B0604020202020204" pitchFamily="34" charset="0"/>
+              </a:rPr>
+              <a:t> </a:t>
+            </a:r>
+            <a:r>
+              <a:rPr lang="en-US" b="0" i="0" dirty="0" err="1">
+                <a:solidFill>
+                  <a:srgbClr val="BDC1C6"/>
+                </a:solidFill>
+                <a:effectLst/>
+                <a:latin typeface="arial" panose="020B0604020202020204" pitchFamily="34" charset="0"/>
+              </a:rPr>
+              <a:t>teszteket</a:t>
+            </a:r>
+            <a:endParaRPr lang="en-US" b="0" i="0" dirty="0">
+              <a:solidFill>
+                <a:srgbClr val="BDC1C6"/>
+              </a:solidFill>
+              <a:effectLst/>
+              <a:latin typeface="arial" panose="020B0604020202020204" pitchFamily="34" charset="0"/>
+            </a:endParaRPr>
+          </a:p>
+        </p:txBody>
+      </p:sp>
+      <p:sp>
+        <p:nvSpPr>
+          <p:cNvPr id="4" name="Szövegdoboz 3">
+            <a:extLst>
+              <a:ext uri="{FF2B5EF4-FFF2-40B4-BE49-F238E27FC236}">
+                <a16:creationId xmlns:a16="http://schemas.microsoft.com/office/drawing/2014/main" id="{C9B3B554-5630-898B-CD4B-E5DB068AE536}"/>
+              </a:ext>
+            </a:extLst>
+          </p:cNvPr>
+          <p:cNvSpPr txBox="1"/>
+          <p:nvPr/>
+        </p:nvSpPr>
+        <p:spPr>
+          <a:xfrm>
+            <a:off x="811213" y="3644900"/>
+            <a:ext cx="3251200" cy="523220"/>
+          </a:xfrm>
+          <a:prstGeom prst="rect">
+            <a:avLst/>
+          </a:prstGeom>
+          <a:noFill/>
+        </p:spPr>
+        <p:txBody>
+          <a:bodyPr wrap="square" rtlCol="0">
+            <a:spAutoFit/>
+          </a:bodyPr>
+          <a:lstStyle/>
+          <a:p>
+            <a:r>
+              <a:rPr lang="en-US" sz="2800" dirty="0" err="1"/>
+              <a:t>Elterjedtek</a:t>
+            </a:r>
+            <a:r>
+              <a:rPr lang="en-US" sz="2800" dirty="0"/>
+              <a:t> </a:t>
+            </a:r>
+            <a:r>
+              <a:rPr lang="en-US" sz="2800" dirty="0" err="1"/>
+              <a:t>még</a:t>
+            </a:r>
+            <a:r>
+              <a:rPr lang="en-US" sz="2800" dirty="0"/>
+              <a:t>:</a:t>
+            </a:r>
+          </a:p>
+        </p:txBody>
+      </p:sp>
+      <p:sp>
+        <p:nvSpPr>
+          <p:cNvPr id="5" name="Szövegdoboz 4">
+            <a:extLst>
+              <a:ext uri="{FF2B5EF4-FFF2-40B4-BE49-F238E27FC236}">
+                <a16:creationId xmlns:a16="http://schemas.microsoft.com/office/drawing/2014/main" id="{F70649B7-FE9B-E2A8-18ED-0AED14F54AAF}"/>
+              </a:ext>
+            </a:extLst>
+          </p:cNvPr>
+          <p:cNvSpPr txBox="1"/>
+          <p:nvPr/>
+        </p:nvSpPr>
+        <p:spPr>
+          <a:xfrm>
+            <a:off x="811213" y="4483269"/>
+            <a:ext cx="4724400" cy="1015663"/>
+          </a:xfrm>
+          <a:prstGeom prst="rect">
+            <a:avLst/>
+          </a:prstGeom>
+          <a:noFill/>
+        </p:spPr>
+        <p:txBody>
+          <a:bodyPr wrap="square" rtlCol="0">
+            <a:spAutoFit/>
+          </a:bodyPr>
+          <a:lstStyle/>
+          <a:p>
+            <a:pPr marL="285750" indent="-285750">
+              <a:buFontTx/>
+              <a:buChar char="-"/>
             </a:pPr>
             <a:r>
-              <a:rPr lang="hu-HU" dirty="0"/>
-              <a:t>N</a:t>
-            </a:r>
-            <a:r>
-              <a:rPr lang="hu-HU" dirty="0" smtClean="0"/>
-              <a:t>incs 100% -</a:t>
-            </a:r>
-            <a:r>
-              <a:rPr lang="hu-HU" dirty="0" err="1" smtClean="0"/>
-              <a:t>os</a:t>
-            </a:r>
-            <a:r>
-              <a:rPr lang="hu-HU" dirty="0" smtClean="0"/>
-              <a:t> biztonság</a:t>
-            </a:r>
-          </a:p>
-          <a:p>
-            <a:pPr marL="0" indent="0">
-              <a:buNone/>
+              <a:rPr lang="en-US" sz="2000" b="0" i="0" dirty="0" err="1">
+                <a:solidFill>
+                  <a:srgbClr val="BDC1C6"/>
+                </a:solidFill>
+                <a:effectLst/>
+                <a:latin typeface="arial" panose="020B0604020202020204" pitchFamily="34" charset="0"/>
+              </a:rPr>
+              <a:t>Hashcat</a:t>
+            </a:r>
+            <a:endParaRPr lang="en-US" sz="2000" b="0" i="0" dirty="0">
+              <a:solidFill>
+                <a:srgbClr val="BDC1C6"/>
+              </a:solidFill>
+              <a:effectLst/>
+              <a:latin typeface="arial" panose="020B0604020202020204" pitchFamily="34" charset="0"/>
+            </a:endParaRPr>
+          </a:p>
+          <a:p>
+            <a:pPr marL="285750" indent="-285750">
+              <a:buFontTx/>
+              <a:buChar char="-"/>
             </a:pPr>
             <a:r>
-              <a:rPr lang="hu-HU" dirty="0" smtClean="0"/>
-              <a:t>Az  etikus hackerek sem tudnak teljes biztonságot teremteni</a:t>
-            </a:r>
-          </a:p>
-          <a:p>
-            <a:pPr marL="0" indent="0">
-              <a:buNone/>
+              <a:rPr lang="en-US" sz="2000" b="0" i="0" dirty="0">
+                <a:solidFill>
+                  <a:srgbClr val="BDC1C6"/>
+                </a:solidFill>
+                <a:effectLst/>
+                <a:latin typeface="arial" panose="020B0604020202020204" pitchFamily="34" charset="0"/>
+              </a:rPr>
+              <a:t>BEEF</a:t>
+            </a:r>
+          </a:p>
+          <a:p>
+            <a:pPr marL="285750" indent="-285750">
+              <a:buFontTx/>
+              <a:buChar char="-"/>
             </a:pPr>
             <a:r>
-              <a:rPr lang="hu-HU" dirty="0" smtClean="0"/>
-              <a:t>a támadók dolgát megnehezíteni</a:t>
-            </a:r>
-          </a:p>
-          <a:p>
-            <a:pPr marL="0" indent="0">
-              <a:buNone/>
-            </a:pPr>
-            <a:endParaRPr lang="hu-HU" dirty="0"/>
-          </a:p>
-        </p:txBody>
-      </p:sp>
+              <a:rPr lang="en-US" sz="2000" b="0" i="0" dirty="0">
+                <a:solidFill>
+                  <a:srgbClr val="BDC1C6"/>
+                </a:solidFill>
+                <a:effectLst/>
+                <a:latin typeface="arial" panose="020B0604020202020204" pitchFamily="34" charset="0"/>
+              </a:rPr>
+              <a:t>Global Exploiter</a:t>
+            </a:r>
+            <a:endParaRPr lang="en-US" sz="2000" dirty="0">
+              <a:solidFill>
+                <a:srgbClr val="BDC1C6"/>
+              </a:solidFill>
+              <a:latin typeface="arial" panose="020B0604020202020204" pitchFamily="34" charset="0"/>
+            </a:endParaRPr>
+          </a:p>
+        </p:txBody>
+      </p:sp>
+      <p:pic>
+        <p:nvPicPr>
+          <p:cNvPr id="7" name="Kép 6" descr="A képen világos látható&#10;&#10;Automatikusan generált leírás">
+            <a:extLst>
+              <a:ext uri="{FF2B5EF4-FFF2-40B4-BE49-F238E27FC236}">
+                <a16:creationId xmlns:a16="http://schemas.microsoft.com/office/drawing/2014/main" id="{047CBE8B-2CCF-EBFE-B357-BBA083DD740F}"/>
+              </a:ext>
+            </a:extLst>
+          </p:cNvPr>
+          <p:cNvPicPr>
+            <a:picLocks noChangeAspect="1"/>
+          </p:cNvPicPr>
+          <p:nvPr/>
+        </p:nvPicPr>
+        <p:blipFill>
+          <a:blip r:embed="rId2"/>
+          <a:stretch>
+            <a:fillRect/>
+          </a:stretch>
+        </p:blipFill>
+        <p:spPr>
+          <a:xfrm>
+            <a:off x="4392613" y="3632201"/>
+            <a:ext cx="3352800" cy="2514600"/>
+          </a:xfrm>
+          <a:prstGeom prst="rect">
+            <a:avLst/>
+          </a:prstGeom>
+        </p:spPr>
+      </p:pic>
     </p:spTree>
     <p:extLst>
       <p:ext uri="{BB962C8B-B14F-4D97-AF65-F5344CB8AC3E}">
-        <p14:creationId xmlns:p14="http://schemas.microsoft.com/office/powerpoint/2010/main" val="3052672992"/>
+        <p14:creationId xmlns:p14="http://schemas.microsoft.com/office/powerpoint/2010/main" val="4182820816"/>
       </p:ext>
     </p:extLst>
   </p:cSld>
@@ -6372,7 +7271,13 @@
       </p:grpSpPr>
       <p:sp>
         <p:nvSpPr>
-          <p:cNvPr id="2" name="Cím 1"/>
+          <p:cNvPr id="2" name="Cím 1">
+            <a:extLst>
+              <a:ext uri="{FF2B5EF4-FFF2-40B4-BE49-F238E27FC236}">
+                <a16:creationId xmlns:a16="http://schemas.microsoft.com/office/drawing/2014/main" id="{74864CB7-48C0-0B16-9196-CA201EB3AE98}"/>
+              </a:ext>
+            </a:extLst>
+          </p:cNvPr>
           <p:cNvSpPr>
             <a:spLocks noGrp="1"/>
           </p:cNvSpPr>
@@ -6382,8 +7287,8 @@
         </p:nvSpPr>
         <p:spPr>
           <a:xfrm>
-            <a:off x="1141413" y="0"/>
-            <a:ext cx="9905998" cy="1905000"/>
+            <a:off x="1143001" y="-98377"/>
+            <a:ext cx="9905998" cy="1485900"/>
           </a:xfrm>
         </p:spPr>
         <p:txBody>
@@ -6392,16 +7297,41 @@
           <a:p>
             <a:pPr algn="ctr"/>
             <a:r>
-              <a:rPr lang="hu-HU" dirty="0" smtClean="0"/>
-              <a:t>Források</a:t>
-            </a:r>
-            <a:endParaRPr lang="hu-HU" dirty="0"/>
-          </a:p>
-        </p:txBody>
-      </p:sp>
-      <p:sp>
-        <p:nvSpPr>
-          <p:cNvPr id="3" name="Tartalom helye 2"/>
+              <a:rPr lang="en-US" dirty="0" err="1"/>
+              <a:t>Hogyan</a:t>
+            </a:r>
+            <a:r>
+              <a:rPr lang="en-US" dirty="0"/>
+              <a:t> </a:t>
+            </a:r>
+            <a:r>
+              <a:rPr lang="en-US" dirty="0" err="1"/>
+              <a:t>tudnak</a:t>
+            </a:r>
+            <a:r>
+              <a:rPr lang="en-US" dirty="0"/>
+              <a:t> </a:t>
+            </a:r>
+            <a:r>
+              <a:rPr lang="en-US" dirty="0" err="1"/>
+              <a:t>feltörni</a:t>
+            </a:r>
+            <a:r>
+              <a:rPr lang="en-US" dirty="0"/>
+              <a:t>?</a:t>
+            </a:r>
+          </a:p>
+        </p:txBody>
+      </p:sp>
+      <p:sp>
+        <p:nvSpPr>
+          <p:cNvPr id="3" name="Tartalom helye 2">
+            <a:extLst>
+              <a:ext uri="{FF2B5EF4-FFF2-40B4-BE49-F238E27FC236}">
+                <a16:creationId xmlns:a16="http://schemas.microsoft.com/office/drawing/2014/main" id="{9DE89A12-302C-257B-69AB-DB611E8A6592}"/>
+              </a:ext>
+            </a:extLst>
+          </p:cNvPr>
           <p:cNvSpPr>
             <a:spLocks noGrp="1"/>
           </p:cNvSpPr>
@@ -6411,7 +7341,7 @@
         </p:nvSpPr>
         <p:spPr>
           <a:xfrm>
-            <a:off x="404813" y="1155699"/>
+            <a:off x="620713" y="1708434"/>
             <a:ext cx="9905998" cy="3124201"/>
           </a:xfrm>
         </p:spPr>
@@ -6419,65 +7349,354 @@
           <a:bodyPr/>
           <a:lstStyle/>
           <a:p>
-            <a:pPr marL="0" indent="0">
-              <a:buNone/>
-            </a:pPr>
-            <a:r>
-              <a:rPr lang="hu-HU" dirty="0">
-                <a:hlinkClick r:id="rId2"/>
-              </a:rPr>
-              <a:t>https://</a:t>
-            </a:r>
-            <a:r>
-              <a:rPr lang="hu-HU" dirty="0" smtClean="0">
-                <a:hlinkClick r:id="rId2"/>
-              </a:rPr>
-              <a:t>blog.crosssec.com/mi-az-az-etikus-hackeles-es-miert-fontos</a:t>
-            </a:r>
-            <a:endParaRPr lang="hu-HU" dirty="0" smtClean="0"/>
-          </a:p>
-          <a:p>
-            <a:pPr marL="0" indent="0">
-              <a:buNone/>
-            </a:pPr>
-            <a:r>
-              <a:rPr lang="hu-HU" dirty="0">
-                <a:hlinkClick r:id="rId2"/>
-              </a:rPr>
-              <a:t>https://</a:t>
-            </a:r>
-            <a:r>
-              <a:rPr lang="hu-HU" dirty="0" smtClean="0">
-                <a:hlinkClick r:id="rId2"/>
-              </a:rPr>
-              <a:t>blog.crosssec.com/mi-az-az-etikus-hackeles-es-miert-fontos</a:t>
-            </a:r>
-            <a:endParaRPr lang="hu-HU" dirty="0" smtClean="0"/>
-          </a:p>
-          <a:p>
-            <a:pPr marL="0" indent="0">
-              <a:buNone/>
-            </a:pPr>
-            <a:endParaRPr lang="hu-HU" dirty="0" smtClean="0"/>
-          </a:p>
-          <a:p>
-            <a:pPr marL="0" indent="0">
-              <a:buNone/>
-            </a:pPr>
-            <a:endParaRPr lang="hu-HU" dirty="0"/>
-          </a:p>
-        </p:txBody>
-      </p:sp>
+            <a:r>
+              <a:rPr lang="en-US" dirty="0"/>
+              <a:t>BRUTEFORCE</a:t>
+            </a:r>
+          </a:p>
+          <a:p>
+            <a:r>
+              <a:rPr lang="en-US" dirty="0"/>
+              <a:t>WORDLIST-ATTACK</a:t>
+            </a:r>
+          </a:p>
+          <a:p>
+            <a:r>
+              <a:rPr lang="en-US" dirty="0"/>
+              <a:t>Beef framework</a:t>
+            </a:r>
+          </a:p>
+          <a:p>
+            <a:r>
+              <a:rPr lang="en-US" dirty="0"/>
+              <a:t>Metasploit payload</a:t>
+            </a:r>
+          </a:p>
+          <a:p>
+            <a:r>
+              <a:rPr lang="en-US" dirty="0" err="1"/>
+              <a:t>Keyloggerek</a:t>
+            </a:r>
+            <a:endParaRPr lang="en-US" dirty="0"/>
+          </a:p>
+        </p:txBody>
+      </p:sp>
+      <p:pic>
+        <p:nvPicPr>
+          <p:cNvPr id="5" name="Kép 4">
+            <a:extLst>
+              <a:ext uri="{FF2B5EF4-FFF2-40B4-BE49-F238E27FC236}">
+                <a16:creationId xmlns:a16="http://schemas.microsoft.com/office/drawing/2014/main" id="{B828778E-9CAD-23A0-0AE8-E053B9798957}"/>
+              </a:ext>
+            </a:extLst>
+          </p:cNvPr>
+          <p:cNvPicPr>
+            <a:picLocks noChangeAspect="1"/>
+          </p:cNvPicPr>
+          <p:nvPr/>
+        </p:nvPicPr>
+        <p:blipFill>
+          <a:blip r:embed="rId2"/>
+          <a:stretch>
+            <a:fillRect/>
+          </a:stretch>
+        </p:blipFill>
+        <p:spPr>
+          <a:xfrm>
+            <a:off x="6122584" y="1387523"/>
+            <a:ext cx="1905000" cy="1419225"/>
+          </a:xfrm>
+          <a:prstGeom prst="rect">
+            <a:avLst/>
+          </a:prstGeom>
+        </p:spPr>
+      </p:pic>
+      <p:pic>
+        <p:nvPicPr>
+          <p:cNvPr id="7" name="Kép 6">
+            <a:extLst>
+              <a:ext uri="{FF2B5EF4-FFF2-40B4-BE49-F238E27FC236}">
+                <a16:creationId xmlns:a16="http://schemas.microsoft.com/office/drawing/2014/main" id="{C1B4D70B-228A-AF17-39F9-4CC40D4ED3C0}"/>
+              </a:ext>
+            </a:extLst>
+          </p:cNvPr>
+          <p:cNvPicPr>
+            <a:picLocks noChangeAspect="1"/>
+          </p:cNvPicPr>
+          <p:nvPr/>
+        </p:nvPicPr>
+        <p:blipFill>
+          <a:blip r:embed="rId3"/>
+          <a:stretch>
+            <a:fillRect/>
+          </a:stretch>
+        </p:blipFill>
+        <p:spPr>
+          <a:xfrm>
+            <a:off x="8027584" y="2844515"/>
+            <a:ext cx="1066800" cy="1168970"/>
+          </a:xfrm>
+          <a:prstGeom prst="rect">
+            <a:avLst/>
+          </a:prstGeom>
+        </p:spPr>
+      </p:pic>
+      <p:pic>
+        <p:nvPicPr>
+          <p:cNvPr id="11" name="Kép 10">
+            <a:extLst>
+              <a:ext uri="{FF2B5EF4-FFF2-40B4-BE49-F238E27FC236}">
+                <a16:creationId xmlns:a16="http://schemas.microsoft.com/office/drawing/2014/main" id="{CC827BDB-0BAD-55E5-0B14-3C0AA66F8850}"/>
+              </a:ext>
+            </a:extLst>
+          </p:cNvPr>
+          <p:cNvPicPr>
+            <a:picLocks noChangeAspect="1"/>
+          </p:cNvPicPr>
+          <p:nvPr/>
+        </p:nvPicPr>
+        <p:blipFill>
+          <a:blip r:embed="rId4"/>
+          <a:stretch>
+            <a:fillRect/>
+          </a:stretch>
+        </p:blipFill>
+        <p:spPr>
+          <a:xfrm>
+            <a:off x="6122584" y="4172692"/>
+            <a:ext cx="1442256" cy="1374554"/>
+          </a:xfrm>
+          <a:prstGeom prst="rect">
+            <a:avLst/>
+          </a:prstGeom>
+        </p:spPr>
+      </p:pic>
+      <p:pic>
+        <p:nvPicPr>
+          <p:cNvPr id="13" name="Kép 12">
+            <a:extLst>
+              <a:ext uri="{FF2B5EF4-FFF2-40B4-BE49-F238E27FC236}">
+                <a16:creationId xmlns:a16="http://schemas.microsoft.com/office/drawing/2014/main" id="{9D4352B7-CB9B-17CA-5130-78FAEB71FDB3}"/>
+              </a:ext>
+            </a:extLst>
+          </p:cNvPr>
+          <p:cNvPicPr>
+            <a:picLocks noChangeAspect="1"/>
+          </p:cNvPicPr>
+          <p:nvPr/>
+        </p:nvPicPr>
+        <p:blipFill>
+          <a:blip r:embed="rId5"/>
+          <a:stretch>
+            <a:fillRect/>
+          </a:stretch>
+        </p:blipFill>
+        <p:spPr>
+          <a:xfrm>
+            <a:off x="4900101" y="2806748"/>
+            <a:ext cx="1169316" cy="1169316"/>
+          </a:xfrm>
+          <a:prstGeom prst="rect">
+            <a:avLst/>
+          </a:prstGeom>
+        </p:spPr>
+      </p:pic>
     </p:spTree>
     <p:extLst>
       <p:ext uri="{BB962C8B-B14F-4D97-AF65-F5344CB8AC3E}">
-        <p14:creationId xmlns:p14="http://schemas.microsoft.com/office/powerpoint/2010/main" val="1677235996"/>
+        <p14:creationId xmlns:p14="http://schemas.microsoft.com/office/powerpoint/2010/main" val="669283992"/>
       </p:ext>
     </p:extLst>
   </p:cSld>
   <p:clrMapOvr>
     <a:masterClrMapping/>
   </p:clrMapOvr>
+  <p:timing>
+    <p:tnLst>
+      <p:par>
+        <p:cTn id="1" dur="indefinite" restart="never" nodeType="tmRoot">
+          <p:childTnLst>
+            <p:seq concurrent="1" nextAc="seek">
+              <p:cTn id="2" dur="indefinite" nodeType="mainSeq">
+                <p:childTnLst>
+                  <p:par>
+                    <p:cTn id="3" fill="hold">
+                      <p:stCondLst>
+                        <p:cond delay="indefinite"/>
+                        <p:cond evt="onBegin" delay="0">
+                          <p:tn val="2"/>
+                        </p:cond>
+                      </p:stCondLst>
+                      <p:childTnLst>
+                        <p:par>
+                          <p:cTn id="4" fill="hold">
+                            <p:stCondLst>
+                              <p:cond delay="0"/>
+                            </p:stCondLst>
+                            <p:childTnLst>
+                              <p:par>
+                                <p:cTn id="5" presetID="1" presetClass="entr" presetSubtype="0" fill="hold" nodeType="afterEffect">
+                                  <p:stCondLst>
+                                    <p:cond delay="500"/>
+                                  </p:stCondLst>
+                                  <p:childTnLst>
+                                    <p:set>
+                                      <p:cBhvr>
+                                        <p:cTn id="6" dur="1" fill="hold">
+                                          <p:stCondLst>
+                                            <p:cond delay="0"/>
+                                          </p:stCondLst>
+                                        </p:cTn>
+                                        <p:tgtEl>
+                                          <p:spTgt spid="13"/>
+                                        </p:tgtEl>
+                                        <p:attrNameLst>
+                                          <p:attrName>style.visibility</p:attrName>
+                                        </p:attrNameLst>
+                                      </p:cBhvr>
+                                      <p:to>
+                                        <p:strVal val="visible"/>
+                                      </p:to>
+                                    </p:set>
+                                  </p:childTnLst>
+                                </p:cTn>
+                              </p:par>
+                            </p:childTnLst>
+                          </p:cTn>
+                        </p:par>
+                        <p:par>
+                          <p:cTn id="7" fill="hold">
+                            <p:stCondLst>
+                              <p:cond delay="500"/>
+                            </p:stCondLst>
+                            <p:childTnLst>
+                              <p:par>
+                                <p:cTn id="8" presetID="1" presetClass="entr" presetSubtype="0" fill="hold" nodeType="afterEffect">
+                                  <p:stCondLst>
+                                    <p:cond delay="500"/>
+                                  </p:stCondLst>
+                                  <p:childTnLst>
+                                    <p:set>
+                                      <p:cBhvr>
+                                        <p:cTn id="9" dur="1" fill="hold">
+                                          <p:stCondLst>
+                                            <p:cond delay="0"/>
+                                          </p:stCondLst>
+                                        </p:cTn>
+                                        <p:tgtEl>
+                                          <p:spTgt spid="11"/>
+                                        </p:tgtEl>
+                                        <p:attrNameLst>
+                                          <p:attrName>style.visibility</p:attrName>
+                                        </p:attrNameLst>
+                                      </p:cBhvr>
+                                      <p:to>
+                                        <p:strVal val="visible"/>
+                                      </p:to>
+                                    </p:set>
+                                  </p:childTnLst>
+                                </p:cTn>
+                              </p:par>
+                            </p:childTnLst>
+                          </p:cTn>
+                        </p:par>
+                        <p:par>
+                          <p:cTn id="10" fill="hold">
+                            <p:stCondLst>
+                              <p:cond delay="1000"/>
+                            </p:stCondLst>
+                            <p:childTnLst>
+                              <p:par>
+                                <p:cTn id="11" presetID="1" presetClass="entr" presetSubtype="0" fill="hold" nodeType="afterEffect">
+                                  <p:stCondLst>
+                                    <p:cond delay="500"/>
+                                  </p:stCondLst>
+                                  <p:childTnLst>
+                                    <p:set>
+                                      <p:cBhvr>
+                                        <p:cTn id="12" dur="1" fill="hold">
+                                          <p:stCondLst>
+                                            <p:cond delay="0"/>
+                                          </p:stCondLst>
+                                        </p:cTn>
+                                        <p:tgtEl>
+                                          <p:spTgt spid="7"/>
+                                        </p:tgtEl>
+                                        <p:attrNameLst>
+                                          <p:attrName>style.visibility</p:attrName>
+                                        </p:attrNameLst>
+                                      </p:cBhvr>
+                                      <p:to>
+                                        <p:strVal val="visible"/>
+                                      </p:to>
+                                    </p:set>
+                                  </p:childTnLst>
+                                </p:cTn>
+                              </p:par>
+                            </p:childTnLst>
+                          </p:cTn>
+                        </p:par>
+                        <p:par>
+                          <p:cTn id="13" fill="hold">
+                            <p:stCondLst>
+                              <p:cond delay="1500"/>
+                            </p:stCondLst>
+                            <p:childTnLst>
+                              <p:par>
+                                <p:cTn id="14" presetID="1" presetClass="entr" presetSubtype="0" fill="hold" nodeType="afterEffect">
+                                  <p:stCondLst>
+                                    <p:cond delay="500"/>
+                                  </p:stCondLst>
+                                  <p:childTnLst>
+                                    <p:set>
+                                      <p:cBhvr>
+                                        <p:cTn id="15" dur="1" fill="hold">
+                                          <p:stCondLst>
+                                            <p:cond delay="0"/>
+                                          </p:stCondLst>
+                                        </p:cTn>
+                                        <p:tgtEl>
+                                          <p:spTgt spid="5"/>
+                                        </p:tgtEl>
+                                        <p:attrNameLst>
+                                          <p:attrName>style.visibility</p:attrName>
+                                        </p:attrNameLst>
+                                      </p:cBhvr>
+                                      <p:to>
+                                        <p:strVal val="visible"/>
+                                      </p:to>
+                                    </p:set>
+                                  </p:childTnLst>
+                                </p:cTn>
+                              </p:par>
+                            </p:childTnLst>
+                          </p:cTn>
+                        </p:par>
+                      </p:childTnLst>
+                    </p:cTn>
+                  </p:par>
+                </p:childTnLst>
+              </p:cTn>
+              <p:prevCondLst>
+                <p:cond evt="onPrev" delay="0">
+                  <p:tgtEl>
+                    <p:sldTgt/>
+                  </p:tgtEl>
+                </p:cond>
+              </p:prevCondLst>
+              <p:nextCondLst>
+                <p:cond evt="onNext" delay="0">
+                  <p:tgtEl>
+                    <p:sldTgt/>
+                  </p:tgtEl>
+                </p:cond>
+              </p:nextCondLst>
+            </p:seq>
+          </p:childTnLst>
+        </p:cTn>
+      </p:par>
+    </p:tnLst>
+  </p:timing>
 </p:sld>
 </file>
 
@@ -6511,7 +7730,7 @@
         <p:spPr>
           <a:xfrm>
             <a:off x="1141413" y="0"/>
-            <a:ext cx="9905998" cy="1905000"/>
+            <a:ext cx="9905998" cy="1346200"/>
           </a:xfrm>
         </p:spPr>
         <p:txBody>
@@ -6520,8 +7739,8 @@
           <a:p>
             <a:pPr algn="ctr"/>
             <a:r>
-              <a:rPr lang="hu-HU" dirty="0" smtClean="0"/>
-              <a:t>Mi a feladatuk?</a:t>
+              <a:rPr lang="en-US" dirty="0" err="1"/>
+              <a:t>Bruteforce</a:t>
             </a:r>
             <a:endParaRPr lang="hu-HU" dirty="0"/>
           </a:p>
@@ -6537,67 +7756,1901 @@
             <p:ph idx="1"/>
           </p:nvPr>
         </p:nvSpPr>
-        <p:spPr/>
+        <p:spPr>
+          <a:xfrm>
+            <a:off x="328613" y="552450"/>
+            <a:ext cx="9905998" cy="3124201"/>
+          </a:xfrm>
+        </p:spPr>
         <p:txBody>
           <a:bodyPr/>
           <a:lstStyle/>
           <a:p>
-            <a:r>
-              <a:rPr lang="hu-HU" dirty="0">
+            <a:pPr>
+              <a:buFont typeface="Arial" panose="020B0604020202020204" pitchFamily="34" charset="0"/>
+              <a:buChar char="•"/>
+            </a:pPr>
+            <a:r>
+              <a:rPr lang="en-US" b="1" i="0" dirty="0" err="1">
+                <a:solidFill>
+                  <a:srgbClr val="00B050"/>
+                </a:solidFill>
                 <a:effectLst/>
+                <a:latin typeface="arial" panose="020B0604020202020204" pitchFamily="34" charset="0"/>
               </a:rPr>
-              <a:t>adatáramlást, a hálózati </a:t>
-            </a:r>
-            <a:r>
-              <a:rPr lang="hu-HU" dirty="0" smtClean="0">
+              <a:t>titkosító</a:t>
+            </a:r>
+            <a:r>
+              <a:rPr lang="en-US" b="1" i="0" dirty="0">
+                <a:solidFill>
+                  <a:srgbClr val="00B050"/>
+                </a:solidFill>
                 <a:effectLst/>
+                <a:latin typeface="arial" panose="020B0604020202020204" pitchFamily="34" charset="0"/>
               </a:rPr>
-              <a:t>tevékenység nyomon követése</a:t>
-            </a:r>
-          </a:p>
-          <a:p>
-            <a:r>
-              <a:rPr lang="hu-HU" dirty="0">
+              <a:t> </a:t>
+            </a:r>
+            <a:r>
+              <a:rPr lang="en-US" b="1" i="0" dirty="0" err="1">
+                <a:solidFill>
+                  <a:srgbClr val="00B050"/>
+                </a:solidFill>
                 <a:effectLst/>
+                <a:latin typeface="arial" panose="020B0604020202020204" pitchFamily="34" charset="0"/>
               </a:rPr>
-              <a:t>ajánlásokat és ötleteket </a:t>
-            </a:r>
-            <a:r>
-              <a:rPr lang="hu-HU" dirty="0" smtClean="0">
+              <a:t>rendszerekkel</a:t>
+            </a:r>
+            <a:r>
+              <a:rPr lang="en-US" b="1" i="0" dirty="0">
+                <a:solidFill>
+                  <a:srgbClr val="00B050"/>
+                </a:solidFill>
                 <a:effectLst/>
+                <a:latin typeface="arial" panose="020B0604020202020204" pitchFamily="34" charset="0"/>
               </a:rPr>
-              <a:t>kínálnak</a:t>
-            </a:r>
-          </a:p>
-          <a:p>
-            <a:r>
-              <a:rPr lang="hu-HU" dirty="0">
+              <a:t> </a:t>
+            </a:r>
+            <a:r>
+              <a:rPr lang="en-US" b="1" i="0" dirty="0" err="1">
+                <a:solidFill>
+                  <a:srgbClr val="00B050"/>
+                </a:solidFill>
                 <a:effectLst/>
+                <a:latin typeface="arial" panose="020B0604020202020204" pitchFamily="34" charset="0"/>
               </a:rPr>
-              <a:t>behatolási </a:t>
-            </a:r>
-            <a:r>
-              <a:rPr lang="hu-HU" dirty="0" smtClean="0">
+              <a:t>szemben</a:t>
+            </a:r>
+            <a:r>
+              <a:rPr lang="en-US" b="1" i="0" dirty="0">
+                <a:solidFill>
+                  <a:srgbClr val="00B050"/>
+                </a:solidFill>
                 <a:effectLst/>
+                <a:latin typeface="arial" panose="020B0604020202020204" pitchFamily="34" charset="0"/>
               </a:rPr>
-              <a:t>tesztek</a:t>
-            </a:r>
-          </a:p>
-          <a:p>
-            <a:endParaRPr lang="hu-HU" dirty="0"/>
-          </a:p>
-        </p:txBody>
-      </p:sp>
+              <a:t> </a:t>
+            </a:r>
+            <a:r>
+              <a:rPr lang="en-US" b="1" i="0" dirty="0" err="1">
+                <a:solidFill>
+                  <a:srgbClr val="00B050"/>
+                </a:solidFill>
+                <a:effectLst/>
+                <a:latin typeface="arial" panose="020B0604020202020204" pitchFamily="34" charset="0"/>
+              </a:rPr>
+              <a:t>alkalmazott</a:t>
+            </a:r>
+            <a:r>
+              <a:rPr lang="en-US" b="1" i="0" dirty="0">
+                <a:solidFill>
+                  <a:srgbClr val="00B050"/>
+                </a:solidFill>
+                <a:effectLst/>
+                <a:latin typeface="arial" panose="020B0604020202020204" pitchFamily="34" charset="0"/>
+              </a:rPr>
+              <a:t> </a:t>
+            </a:r>
+            <a:r>
+              <a:rPr lang="en-US" b="1" i="0" dirty="0" err="1">
+                <a:solidFill>
+                  <a:srgbClr val="00B050"/>
+                </a:solidFill>
+                <a:effectLst/>
+                <a:latin typeface="arial" panose="020B0604020202020204" pitchFamily="34" charset="0"/>
+              </a:rPr>
+              <a:t>támadási</a:t>
+            </a:r>
+            <a:r>
+              <a:rPr lang="en-US" b="1" i="0" dirty="0">
+                <a:solidFill>
+                  <a:srgbClr val="00B050"/>
+                </a:solidFill>
+                <a:effectLst/>
+                <a:latin typeface="arial" panose="020B0604020202020204" pitchFamily="34" charset="0"/>
+              </a:rPr>
+              <a:t> </a:t>
+            </a:r>
+            <a:r>
+              <a:rPr lang="en-US" b="1" i="0" dirty="0" err="1">
+                <a:solidFill>
+                  <a:srgbClr val="00B050"/>
+                </a:solidFill>
+                <a:effectLst/>
+                <a:latin typeface="arial" panose="020B0604020202020204" pitchFamily="34" charset="0"/>
+              </a:rPr>
+              <a:t>mód</a:t>
+            </a:r>
+            <a:endParaRPr lang="en-US" b="1" i="0" dirty="0">
+              <a:solidFill>
+                <a:srgbClr val="00B050"/>
+              </a:solidFill>
+              <a:effectLst/>
+              <a:latin typeface="arial" panose="020B0604020202020204" pitchFamily="34" charset="0"/>
+            </a:endParaRPr>
+          </a:p>
+          <a:p>
+            <a:pPr marL="0" indent="0">
+              <a:buNone/>
+            </a:pPr>
+            <a:r>
+              <a:rPr lang="en-US" b="1" dirty="0" err="1"/>
+              <a:t>Működése</a:t>
+            </a:r>
+            <a:r>
+              <a:rPr lang="en-US" b="1" dirty="0"/>
+              <a:t>:</a:t>
+            </a:r>
+          </a:p>
+          <a:p>
+            <a:pPr marL="0" indent="0">
+              <a:buNone/>
+            </a:pPr>
+            <a:r>
+              <a:rPr lang="en-US" sz="2400" dirty="0" err="1"/>
+              <a:t>az</a:t>
+            </a:r>
+            <a:r>
+              <a:rPr lang="en-US" sz="2400" dirty="0"/>
+              <a:t> </a:t>
+            </a:r>
+            <a:r>
+              <a:rPr lang="en-US" sz="2400" dirty="0" err="1"/>
+              <a:t>összes</a:t>
+            </a:r>
+            <a:r>
+              <a:rPr lang="en-US" sz="2400" dirty="0"/>
+              <a:t> </a:t>
+            </a:r>
+            <a:r>
+              <a:rPr lang="en-US" sz="2400" dirty="0" err="1"/>
+              <a:t>lehetséges</a:t>
+            </a:r>
+            <a:r>
+              <a:rPr lang="en-US" sz="2400" dirty="0"/>
+              <a:t> </a:t>
+            </a:r>
+            <a:r>
+              <a:rPr lang="en-US" sz="2400" dirty="0" err="1"/>
+              <a:t>változatot</a:t>
+            </a:r>
+            <a:r>
+              <a:rPr lang="en-US" sz="2400" dirty="0"/>
+              <a:t> </a:t>
+            </a:r>
+            <a:r>
+              <a:rPr lang="en-US" sz="2400" dirty="0" err="1"/>
+              <a:t>kipróbája</a:t>
+            </a:r>
+            <a:r>
+              <a:rPr lang="en-US" sz="2400" dirty="0"/>
+              <a:t>, </a:t>
+            </a:r>
+            <a:r>
+              <a:rPr lang="en-US" sz="2400" dirty="0" err="1"/>
+              <a:t>hogy</a:t>
+            </a:r>
+            <a:r>
+              <a:rPr lang="en-US" sz="2400" dirty="0"/>
+              <a:t> </a:t>
+            </a:r>
+            <a:r>
+              <a:rPr lang="en-US" sz="2400" dirty="0" err="1"/>
+              <a:t>feltörje</a:t>
+            </a:r>
+            <a:endParaRPr lang="en-US" sz="2400" dirty="0"/>
+          </a:p>
+        </p:txBody>
+      </p:sp>
+      <p:sp>
+        <p:nvSpPr>
+          <p:cNvPr id="4" name="Szövegdoboz 3">
+            <a:extLst>
+              <a:ext uri="{FF2B5EF4-FFF2-40B4-BE49-F238E27FC236}">
+                <a16:creationId xmlns:a16="http://schemas.microsoft.com/office/drawing/2014/main" id="{C4C21B93-831D-A9DA-D4CF-B36ABE9F3550}"/>
+              </a:ext>
+            </a:extLst>
+          </p:cNvPr>
+          <p:cNvSpPr txBox="1"/>
+          <p:nvPr/>
+        </p:nvSpPr>
+        <p:spPr>
+          <a:xfrm>
+            <a:off x="328613" y="3307319"/>
+            <a:ext cx="2527300" cy="369332"/>
+          </a:xfrm>
+          <a:prstGeom prst="rect">
+            <a:avLst/>
+          </a:prstGeom>
+          <a:noFill/>
+        </p:spPr>
+        <p:txBody>
+          <a:bodyPr wrap="square" rtlCol="0">
+            <a:spAutoFit/>
+          </a:bodyPr>
+          <a:lstStyle/>
+          <a:p>
+            <a:r>
+              <a:rPr lang="en-US" dirty="0" err="1"/>
+              <a:t>Mindig</a:t>
+            </a:r>
+            <a:r>
+              <a:rPr lang="en-US" dirty="0"/>
+              <a:t> </a:t>
+            </a:r>
+            <a:r>
+              <a:rPr lang="en-US" dirty="0" err="1"/>
+              <a:t>sikerül</a:t>
+            </a:r>
+            <a:r>
+              <a:rPr lang="en-US" dirty="0"/>
+              <a:t>?</a:t>
+            </a:r>
+          </a:p>
+        </p:txBody>
+      </p:sp>
+      <p:sp>
+        <p:nvSpPr>
+          <p:cNvPr id="6" name="Szövegdoboz 5">
+            <a:extLst>
+              <a:ext uri="{FF2B5EF4-FFF2-40B4-BE49-F238E27FC236}">
+                <a16:creationId xmlns:a16="http://schemas.microsoft.com/office/drawing/2014/main" id="{96A02377-1537-F7D9-2B2C-9B5A7E68C2E2}"/>
+              </a:ext>
+            </a:extLst>
+          </p:cNvPr>
+          <p:cNvSpPr txBox="1"/>
+          <p:nvPr/>
+        </p:nvSpPr>
+        <p:spPr>
+          <a:xfrm>
+            <a:off x="685800" y="3639234"/>
+            <a:ext cx="5410200" cy="369332"/>
+          </a:xfrm>
+          <a:prstGeom prst="rect">
+            <a:avLst/>
+          </a:prstGeom>
+          <a:noFill/>
+        </p:spPr>
+        <p:txBody>
+          <a:bodyPr wrap="square" rtlCol="0">
+            <a:spAutoFit/>
+          </a:bodyPr>
+          <a:lstStyle/>
+          <a:p>
+            <a:r>
+              <a:rPr lang="en-US" dirty="0" err="1"/>
+              <a:t>Függ</a:t>
+            </a:r>
+            <a:r>
+              <a:rPr lang="en-US" dirty="0"/>
+              <a:t>: A </a:t>
+            </a:r>
+            <a:r>
+              <a:rPr lang="en-US" dirty="0" err="1"/>
+              <a:t>szg</a:t>
+            </a:r>
+            <a:r>
+              <a:rPr lang="en-US" dirty="0"/>
+              <a:t>. </a:t>
+            </a:r>
+            <a:r>
+              <a:rPr lang="en-US" dirty="0" err="1"/>
+              <a:t>hatékonysága</a:t>
+            </a:r>
+            <a:r>
+              <a:rPr lang="en-US" dirty="0"/>
+              <a:t>, </a:t>
+            </a:r>
+            <a:r>
+              <a:rPr lang="en-US" dirty="0" err="1"/>
+              <a:t>jelszó</a:t>
+            </a:r>
+            <a:r>
+              <a:rPr lang="en-US" dirty="0"/>
+              <a:t> </a:t>
+            </a:r>
+            <a:r>
+              <a:rPr lang="en-US" dirty="0" err="1"/>
+              <a:t>hosszától</a:t>
+            </a:r>
+            <a:r>
+              <a:rPr lang="en-US" dirty="0"/>
+              <a:t>.</a:t>
+            </a:r>
+          </a:p>
+        </p:txBody>
+      </p:sp>
+      <p:pic>
+        <p:nvPicPr>
+          <p:cNvPr id="8" name="Kép 7">
+            <a:extLst>
+              <a:ext uri="{FF2B5EF4-FFF2-40B4-BE49-F238E27FC236}">
+                <a16:creationId xmlns:a16="http://schemas.microsoft.com/office/drawing/2014/main" id="{DDD71F49-99FA-5BD2-E7C1-C1F1F7D49D05}"/>
+              </a:ext>
+            </a:extLst>
+          </p:cNvPr>
+          <p:cNvPicPr>
+            <a:picLocks noChangeAspect="1"/>
+          </p:cNvPicPr>
+          <p:nvPr/>
+        </p:nvPicPr>
+        <p:blipFill>
+          <a:blip r:embed="rId2"/>
+          <a:stretch>
+            <a:fillRect/>
+          </a:stretch>
+        </p:blipFill>
+        <p:spPr>
+          <a:xfrm>
+            <a:off x="6272210" y="2894868"/>
+            <a:ext cx="3519488" cy="3684464"/>
+          </a:xfrm>
+          <a:prstGeom prst="rect">
+            <a:avLst/>
+          </a:prstGeom>
+        </p:spPr>
+      </p:pic>
+      <p:sp>
+        <p:nvSpPr>
+          <p:cNvPr id="9" name="Szövegdoboz 8">
+            <a:extLst>
+              <a:ext uri="{FF2B5EF4-FFF2-40B4-BE49-F238E27FC236}">
+                <a16:creationId xmlns:a16="http://schemas.microsoft.com/office/drawing/2014/main" id="{DD433715-83EE-C79A-EEA6-703F1B0E7788}"/>
+              </a:ext>
+            </a:extLst>
+          </p:cNvPr>
+          <p:cNvSpPr txBox="1"/>
+          <p:nvPr/>
+        </p:nvSpPr>
+        <p:spPr>
+          <a:xfrm>
+            <a:off x="685800" y="4858801"/>
+            <a:ext cx="2603500" cy="646331"/>
+          </a:xfrm>
+          <a:prstGeom prst="rect">
+            <a:avLst/>
+          </a:prstGeom>
+          <a:noFill/>
+        </p:spPr>
+        <p:txBody>
+          <a:bodyPr wrap="square" rtlCol="0">
+            <a:spAutoFit/>
+          </a:bodyPr>
+          <a:lstStyle/>
+          <a:p>
+            <a:pPr marL="285750" indent="-285750">
+              <a:buFont typeface="Arial" panose="020B0604020202020204" pitchFamily="34" charset="0"/>
+              <a:buChar char="•"/>
+            </a:pPr>
+            <a:r>
+              <a:rPr lang="en-US" dirty="0"/>
+              <a:t>Hydra</a:t>
+            </a:r>
+          </a:p>
+          <a:p>
+            <a:pPr marL="285750" indent="-285750">
+              <a:buFont typeface="Arial" panose="020B0604020202020204" pitchFamily="34" charset="0"/>
+              <a:buChar char="•"/>
+            </a:pPr>
+            <a:r>
+              <a:rPr lang="en-US" dirty="0"/>
+              <a:t>NMAP</a:t>
+            </a:r>
+          </a:p>
+        </p:txBody>
+      </p:sp>
+      <p:sp>
+        <p:nvSpPr>
+          <p:cNvPr id="10" name="Szövegdoboz 9">
+            <a:extLst>
+              <a:ext uri="{FF2B5EF4-FFF2-40B4-BE49-F238E27FC236}">
+                <a16:creationId xmlns:a16="http://schemas.microsoft.com/office/drawing/2014/main" id="{64F09ABE-44C7-86E4-FE6A-806C1E4EB79F}"/>
+              </a:ext>
+            </a:extLst>
+          </p:cNvPr>
+          <p:cNvSpPr txBox="1"/>
+          <p:nvPr/>
+        </p:nvSpPr>
+        <p:spPr>
+          <a:xfrm>
+            <a:off x="685800" y="4376201"/>
+            <a:ext cx="3111500" cy="374650"/>
+          </a:xfrm>
+          <a:prstGeom prst="rect">
+            <a:avLst/>
+          </a:prstGeom>
+          <a:noFill/>
+        </p:spPr>
+        <p:txBody>
+          <a:bodyPr wrap="square" rtlCol="0">
+            <a:spAutoFit/>
+          </a:bodyPr>
+          <a:lstStyle/>
+          <a:p>
+            <a:r>
+              <a:rPr lang="en-US" dirty="0" err="1"/>
+              <a:t>Programok</a:t>
+            </a:r>
+            <a:r>
+              <a:rPr lang="en-US" dirty="0"/>
+              <a:t>:</a:t>
+            </a:r>
+          </a:p>
+        </p:txBody>
+      </p:sp>
+      <p:pic>
+        <p:nvPicPr>
+          <p:cNvPr id="11" name="Kép 10">
+            <a:extLst>
+              <a:ext uri="{FF2B5EF4-FFF2-40B4-BE49-F238E27FC236}">
+                <a16:creationId xmlns:a16="http://schemas.microsoft.com/office/drawing/2014/main" id="{EFA0A17C-DC52-D4C3-0B8C-B164A7D29DD2}"/>
+              </a:ext>
+            </a:extLst>
+          </p:cNvPr>
+          <p:cNvPicPr>
+            <a:picLocks noChangeAspect="1"/>
+          </p:cNvPicPr>
+          <p:nvPr/>
+        </p:nvPicPr>
+        <p:blipFill>
+          <a:blip r:embed="rId3"/>
+          <a:stretch>
+            <a:fillRect/>
+          </a:stretch>
+        </p:blipFill>
+        <p:spPr>
+          <a:xfrm>
+            <a:off x="10462753" y="366560"/>
+            <a:ext cx="1169316" cy="1169316"/>
+          </a:xfrm>
+          <a:prstGeom prst="rect">
+            <a:avLst/>
+          </a:prstGeom>
+        </p:spPr>
+      </p:pic>
     </p:spTree>
     <p:extLst>
       <p:ext uri="{BB962C8B-B14F-4D97-AF65-F5344CB8AC3E}">
-        <p14:creationId xmlns:p14="http://schemas.microsoft.com/office/powerpoint/2010/main" val="3825328551"/>
+        <p14:creationId xmlns:p14="http://schemas.microsoft.com/office/powerpoint/2010/main" val="3052672992"/>
       </p:ext>
     </p:extLst>
   </p:cSld>
   <p:clrMapOvr>
     <a:masterClrMapping/>
   </p:clrMapOvr>
+  <p:timing>
+    <p:tnLst>
+      <p:par>
+        <p:cTn id="1" dur="indefinite" restart="never" nodeType="tmRoot">
+          <p:childTnLst>
+            <p:seq concurrent="1" nextAc="seek">
+              <p:cTn id="2" dur="indefinite" nodeType="mainSeq">
+                <p:childTnLst>
+                  <p:par>
+                    <p:cTn id="3" fill="hold">
+                      <p:stCondLst>
+                        <p:cond delay="indefinite"/>
+                        <p:cond evt="onBegin" delay="0">
+                          <p:tn val="2"/>
+                        </p:cond>
+                      </p:stCondLst>
+                      <p:childTnLst>
+                        <p:par>
+                          <p:cTn id="4" fill="hold">
+                            <p:stCondLst>
+                              <p:cond delay="0"/>
+                            </p:stCondLst>
+                            <p:childTnLst>
+                              <p:par>
+                                <p:cTn id="5" presetID="1" presetClass="entr" presetSubtype="0" fill="hold" nodeType="afterEffect">
+                                  <p:stCondLst>
+                                    <p:cond delay="500"/>
+                                  </p:stCondLst>
+                                  <p:childTnLst>
+                                    <p:set>
+                                      <p:cBhvr>
+                                        <p:cTn id="6" dur="1" fill="hold">
+                                          <p:stCondLst>
+                                            <p:cond delay="0"/>
+                                          </p:stCondLst>
+                                        </p:cTn>
+                                        <p:tgtEl>
+                                          <p:spTgt spid="11"/>
+                                        </p:tgtEl>
+                                        <p:attrNameLst>
+                                          <p:attrName>style.visibility</p:attrName>
+                                        </p:attrNameLst>
+                                      </p:cBhvr>
+                                      <p:to>
+                                        <p:strVal val="visible"/>
+                                      </p:to>
+                                    </p:set>
+                                  </p:childTnLst>
+                                </p:cTn>
+                              </p:par>
+                            </p:childTnLst>
+                          </p:cTn>
+                        </p:par>
+                      </p:childTnLst>
+                    </p:cTn>
+                  </p:par>
+                </p:childTnLst>
+              </p:cTn>
+              <p:prevCondLst>
+                <p:cond evt="onPrev" delay="0">
+                  <p:tgtEl>
+                    <p:sldTgt/>
+                  </p:tgtEl>
+                </p:cond>
+              </p:prevCondLst>
+              <p:nextCondLst>
+                <p:cond evt="onNext" delay="0">
+                  <p:tgtEl>
+                    <p:sldTgt/>
+                  </p:tgtEl>
+                </p:cond>
+              </p:nextCondLst>
+            </p:seq>
+          </p:childTnLst>
+        </p:cTn>
+      </p:par>
+    </p:tnLst>
+  </p:timing>
+</p:sld>
+</file>
+
+<file path=ppt/slides/slide7.xml><?xml version="1.0" encoding="utf-8"?>
+<p:sld xmlns:a="http://schemas.openxmlformats.org/drawingml/2006/main" xmlns:r="http://schemas.openxmlformats.org/officeDocument/2006/relationships" xmlns:p="http://schemas.openxmlformats.org/presentationml/2006/main">
+  <p:cSld>
+    <p:spTree>
+      <p:nvGrpSpPr>
+        <p:cNvPr id="1" name=""/>
+        <p:cNvGrpSpPr/>
+        <p:nvPr/>
+      </p:nvGrpSpPr>
+      <p:grpSpPr>
+        <a:xfrm>
+          <a:off x="0" y="0"/>
+          <a:ext cx="0" cy="0"/>
+          <a:chOff x="0" y="0"/>
+          <a:chExt cx="0" cy="0"/>
+        </a:xfrm>
+      </p:grpSpPr>
+      <p:sp>
+        <p:nvSpPr>
+          <p:cNvPr id="2" name="Cím 1">
+            <a:extLst>
+              <a:ext uri="{FF2B5EF4-FFF2-40B4-BE49-F238E27FC236}">
+                <a16:creationId xmlns:a16="http://schemas.microsoft.com/office/drawing/2014/main" id="{C1535803-AFA0-F291-1206-2DEC7BE5CB0E}"/>
+              </a:ext>
+            </a:extLst>
+          </p:cNvPr>
+          <p:cNvSpPr>
+            <a:spLocks noGrp="1"/>
+          </p:cNvSpPr>
+          <p:nvPr>
+            <p:ph type="title"/>
+          </p:nvPr>
+        </p:nvSpPr>
+        <p:spPr>
+          <a:xfrm>
+            <a:off x="1141413" y="393700"/>
+            <a:ext cx="9905998" cy="800100"/>
+          </a:xfrm>
+        </p:spPr>
+        <p:txBody>
+          <a:bodyPr/>
+          <a:lstStyle/>
+          <a:p>
+            <a:pPr algn="ctr"/>
+            <a:r>
+              <a:rPr lang="en-US" dirty="0"/>
+              <a:t>Wordlist-attack </a:t>
+            </a:r>
+          </a:p>
+        </p:txBody>
+      </p:sp>
+      <p:sp>
+        <p:nvSpPr>
+          <p:cNvPr id="3" name="Tartalom helye 2">
+            <a:extLst>
+              <a:ext uri="{FF2B5EF4-FFF2-40B4-BE49-F238E27FC236}">
+                <a16:creationId xmlns:a16="http://schemas.microsoft.com/office/drawing/2014/main" id="{03F6E91D-0CA7-F92C-4F10-01B27A8DDE9B}"/>
+              </a:ext>
+            </a:extLst>
+          </p:cNvPr>
+          <p:cNvSpPr>
+            <a:spLocks noGrp="1"/>
+          </p:cNvSpPr>
+          <p:nvPr>
+            <p:ph idx="1"/>
+          </p:nvPr>
+        </p:nvSpPr>
+        <p:spPr>
+          <a:xfrm>
+            <a:off x="392113" y="971550"/>
+            <a:ext cx="9905998" cy="2095500"/>
+          </a:xfrm>
+        </p:spPr>
+        <p:txBody>
+          <a:bodyPr/>
+          <a:lstStyle/>
+          <a:p>
+            <a:pPr marL="0" indent="0">
+              <a:buNone/>
+            </a:pPr>
+            <a:r>
+              <a:rPr lang="en-US" dirty="0"/>
+              <a:t>A </a:t>
+            </a:r>
+            <a:r>
+              <a:rPr lang="en-US" dirty="0" err="1"/>
+              <a:t>bruteforce</a:t>
+            </a:r>
+            <a:r>
+              <a:rPr lang="en-US" dirty="0"/>
+              <a:t> –al </a:t>
+            </a:r>
+            <a:r>
+              <a:rPr lang="en-US" dirty="0" err="1"/>
+              <a:t>ellentétben</a:t>
+            </a:r>
+            <a:r>
+              <a:rPr lang="en-US" dirty="0"/>
+              <a:t> </a:t>
+            </a:r>
+            <a:r>
+              <a:rPr lang="en-US" dirty="0" err="1"/>
+              <a:t>egy</a:t>
+            </a:r>
+            <a:r>
+              <a:rPr lang="en-US" dirty="0"/>
+              <a:t> </a:t>
+            </a:r>
+            <a:r>
+              <a:rPr lang="en-US" dirty="0" err="1"/>
+              <a:t>szótárból</a:t>
+            </a:r>
+            <a:r>
+              <a:rPr lang="en-US" dirty="0"/>
+              <a:t> </a:t>
+            </a:r>
+            <a:r>
+              <a:rPr lang="en-US" dirty="0" err="1"/>
+              <a:t>próbálja</a:t>
+            </a:r>
+            <a:r>
+              <a:rPr lang="en-US" dirty="0"/>
+              <a:t> </a:t>
+            </a:r>
+            <a:r>
+              <a:rPr lang="en-US" dirty="0" err="1"/>
+              <a:t>kideríteni</a:t>
+            </a:r>
+            <a:r>
+              <a:rPr lang="en-US" dirty="0"/>
+              <a:t> </a:t>
+            </a:r>
+            <a:r>
+              <a:rPr lang="en-US" dirty="0" err="1"/>
+              <a:t>az</a:t>
+            </a:r>
+            <a:r>
+              <a:rPr lang="en-US" dirty="0"/>
+              <a:t> </a:t>
+            </a:r>
+            <a:r>
+              <a:rPr lang="en-US" dirty="0" err="1"/>
+              <a:t>adatot</a:t>
+            </a:r>
+            <a:r>
+              <a:rPr lang="en-US" dirty="0"/>
+              <a:t>.</a:t>
+            </a:r>
+          </a:p>
+          <a:p>
+            <a:pPr marL="0" indent="0">
+              <a:buNone/>
+            </a:pPr>
+            <a:r>
+              <a:rPr lang="en-US" dirty="0"/>
+              <a:t>A </a:t>
+            </a:r>
+            <a:r>
+              <a:rPr lang="en-US" dirty="0" err="1"/>
+              <a:t>szótárban</a:t>
+            </a:r>
+            <a:r>
+              <a:rPr lang="en-US" dirty="0"/>
+              <a:t> </a:t>
+            </a:r>
+            <a:r>
+              <a:rPr lang="en-US" dirty="0" err="1"/>
+              <a:t>lévő</a:t>
+            </a:r>
+            <a:r>
+              <a:rPr lang="en-US" dirty="0"/>
+              <a:t> </a:t>
+            </a:r>
+            <a:r>
+              <a:rPr lang="en-US" dirty="0" err="1"/>
+              <a:t>adatokat</a:t>
+            </a:r>
+            <a:r>
+              <a:rPr lang="en-US" dirty="0"/>
+              <a:t> </a:t>
+            </a:r>
+            <a:r>
+              <a:rPr lang="en-US" dirty="0" err="1"/>
+              <a:t>helyettesíti</a:t>
+            </a:r>
+            <a:r>
+              <a:rPr lang="en-US" dirty="0"/>
+              <a:t> be.</a:t>
+            </a:r>
+          </a:p>
+        </p:txBody>
+      </p:sp>
+      <p:sp>
+        <p:nvSpPr>
+          <p:cNvPr id="4" name="Szövegdoboz 3">
+            <a:extLst>
+              <a:ext uri="{FF2B5EF4-FFF2-40B4-BE49-F238E27FC236}">
+                <a16:creationId xmlns:a16="http://schemas.microsoft.com/office/drawing/2014/main" id="{8D4FCE8D-25A5-3785-C56D-2C801208025F}"/>
+              </a:ext>
+            </a:extLst>
+          </p:cNvPr>
+          <p:cNvSpPr txBox="1"/>
+          <p:nvPr/>
+        </p:nvSpPr>
+        <p:spPr>
+          <a:xfrm>
+            <a:off x="392113" y="3225800"/>
+            <a:ext cx="2603500" cy="646331"/>
+          </a:xfrm>
+          <a:prstGeom prst="rect">
+            <a:avLst/>
+          </a:prstGeom>
+          <a:noFill/>
+        </p:spPr>
+        <p:txBody>
+          <a:bodyPr wrap="square" rtlCol="0">
+            <a:spAutoFit/>
+          </a:bodyPr>
+          <a:lstStyle/>
+          <a:p>
+            <a:pPr marL="285750" indent="-285750">
+              <a:buFont typeface="Arial" panose="020B0604020202020204" pitchFamily="34" charset="0"/>
+              <a:buChar char="•"/>
+            </a:pPr>
+            <a:r>
+              <a:rPr lang="en-US" dirty="0"/>
+              <a:t>Hydra</a:t>
+            </a:r>
+          </a:p>
+          <a:p>
+            <a:pPr marL="285750" indent="-285750">
+              <a:buFont typeface="Arial" panose="020B0604020202020204" pitchFamily="34" charset="0"/>
+              <a:buChar char="•"/>
+            </a:pPr>
+            <a:r>
+              <a:rPr lang="en-US" dirty="0"/>
+              <a:t>NMAP</a:t>
+            </a:r>
+          </a:p>
+        </p:txBody>
+      </p:sp>
+      <p:sp>
+        <p:nvSpPr>
+          <p:cNvPr id="5" name="Szövegdoboz 4">
+            <a:extLst>
+              <a:ext uri="{FF2B5EF4-FFF2-40B4-BE49-F238E27FC236}">
+                <a16:creationId xmlns:a16="http://schemas.microsoft.com/office/drawing/2014/main" id="{2403EC15-2550-C8BE-5E5D-46C5FB951E8C}"/>
+              </a:ext>
+            </a:extLst>
+          </p:cNvPr>
+          <p:cNvSpPr txBox="1"/>
+          <p:nvPr/>
+        </p:nvSpPr>
+        <p:spPr>
+          <a:xfrm>
+            <a:off x="392113" y="2743200"/>
+            <a:ext cx="3111500" cy="374650"/>
+          </a:xfrm>
+          <a:prstGeom prst="rect">
+            <a:avLst/>
+          </a:prstGeom>
+          <a:noFill/>
+        </p:spPr>
+        <p:txBody>
+          <a:bodyPr wrap="square" rtlCol="0">
+            <a:spAutoFit/>
+          </a:bodyPr>
+          <a:lstStyle/>
+          <a:p>
+            <a:r>
+              <a:rPr lang="en-US" dirty="0" err="1"/>
+              <a:t>Programok</a:t>
+            </a:r>
+            <a:r>
+              <a:rPr lang="en-US" dirty="0"/>
+              <a:t>:</a:t>
+            </a:r>
+          </a:p>
+        </p:txBody>
+      </p:sp>
+      <p:pic>
+        <p:nvPicPr>
+          <p:cNvPr id="7" name="Kép 6">
+            <a:extLst>
+              <a:ext uri="{FF2B5EF4-FFF2-40B4-BE49-F238E27FC236}">
+                <a16:creationId xmlns:a16="http://schemas.microsoft.com/office/drawing/2014/main" id="{126E39BC-838F-DAD8-CF2C-E2F016F6C565}"/>
+              </a:ext>
+            </a:extLst>
+          </p:cNvPr>
+          <p:cNvPicPr>
+            <a:picLocks noChangeAspect="1"/>
+          </p:cNvPicPr>
+          <p:nvPr/>
+        </p:nvPicPr>
+        <p:blipFill>
+          <a:blip r:embed="rId2"/>
+          <a:stretch>
+            <a:fillRect/>
+          </a:stretch>
+        </p:blipFill>
+        <p:spPr>
+          <a:xfrm>
+            <a:off x="3446465" y="2743200"/>
+            <a:ext cx="5241924" cy="3491928"/>
+          </a:xfrm>
+          <a:prstGeom prst="rect">
+            <a:avLst/>
+          </a:prstGeom>
+        </p:spPr>
+      </p:pic>
+      <p:pic>
+        <p:nvPicPr>
+          <p:cNvPr id="8" name="Kép 7">
+            <a:extLst>
+              <a:ext uri="{FF2B5EF4-FFF2-40B4-BE49-F238E27FC236}">
+                <a16:creationId xmlns:a16="http://schemas.microsoft.com/office/drawing/2014/main" id="{E47DA4F9-1363-B0D8-C27B-A2CCA23F7BC0}"/>
+              </a:ext>
+            </a:extLst>
+          </p:cNvPr>
+          <p:cNvPicPr>
+            <a:picLocks noChangeAspect="1"/>
+          </p:cNvPicPr>
+          <p:nvPr/>
+        </p:nvPicPr>
+        <p:blipFill>
+          <a:blip r:embed="rId3"/>
+          <a:stretch>
+            <a:fillRect/>
+          </a:stretch>
+        </p:blipFill>
+        <p:spPr>
+          <a:xfrm>
+            <a:off x="10462753" y="386892"/>
+            <a:ext cx="1169316" cy="1169316"/>
+          </a:xfrm>
+          <a:prstGeom prst="rect">
+            <a:avLst/>
+          </a:prstGeom>
+        </p:spPr>
+      </p:pic>
+    </p:spTree>
+    <p:extLst>
+      <p:ext uri="{BB962C8B-B14F-4D97-AF65-F5344CB8AC3E}">
+        <p14:creationId xmlns:p14="http://schemas.microsoft.com/office/powerpoint/2010/main" val="13021412"/>
+      </p:ext>
+    </p:extLst>
+  </p:cSld>
+  <p:clrMapOvr>
+    <a:masterClrMapping/>
+  </p:clrMapOvr>
+  <p:timing>
+    <p:tnLst>
+      <p:par>
+        <p:cTn id="1" dur="indefinite" restart="never" nodeType="tmRoot">
+          <p:childTnLst>
+            <p:seq concurrent="1" nextAc="seek">
+              <p:cTn id="2" dur="indefinite" nodeType="mainSeq">
+                <p:childTnLst>
+                  <p:par>
+                    <p:cTn id="3" fill="hold">
+                      <p:stCondLst>
+                        <p:cond delay="indefinite"/>
+                        <p:cond evt="onBegin" delay="0">
+                          <p:tn val="2"/>
+                        </p:cond>
+                      </p:stCondLst>
+                      <p:childTnLst>
+                        <p:par>
+                          <p:cTn id="4" fill="hold">
+                            <p:stCondLst>
+                              <p:cond delay="0"/>
+                            </p:stCondLst>
+                            <p:childTnLst>
+                              <p:par>
+                                <p:cTn id="5" presetID="1" presetClass="entr" presetSubtype="0" fill="hold" nodeType="afterEffect">
+                                  <p:stCondLst>
+                                    <p:cond delay="500"/>
+                                  </p:stCondLst>
+                                  <p:childTnLst>
+                                    <p:set>
+                                      <p:cBhvr>
+                                        <p:cTn id="6" dur="1" fill="hold">
+                                          <p:stCondLst>
+                                            <p:cond delay="0"/>
+                                          </p:stCondLst>
+                                        </p:cTn>
+                                        <p:tgtEl>
+                                          <p:spTgt spid="8"/>
+                                        </p:tgtEl>
+                                        <p:attrNameLst>
+                                          <p:attrName>style.visibility</p:attrName>
+                                        </p:attrNameLst>
+                                      </p:cBhvr>
+                                      <p:to>
+                                        <p:strVal val="visible"/>
+                                      </p:to>
+                                    </p:set>
+                                  </p:childTnLst>
+                                </p:cTn>
+                              </p:par>
+                            </p:childTnLst>
+                          </p:cTn>
+                        </p:par>
+                      </p:childTnLst>
+                    </p:cTn>
+                  </p:par>
+                </p:childTnLst>
+              </p:cTn>
+              <p:prevCondLst>
+                <p:cond evt="onPrev" delay="0">
+                  <p:tgtEl>
+                    <p:sldTgt/>
+                  </p:tgtEl>
+                </p:cond>
+              </p:prevCondLst>
+              <p:nextCondLst>
+                <p:cond evt="onNext" delay="0">
+                  <p:tgtEl>
+                    <p:sldTgt/>
+                  </p:tgtEl>
+                </p:cond>
+              </p:nextCondLst>
+            </p:seq>
+          </p:childTnLst>
+        </p:cTn>
+      </p:par>
+    </p:tnLst>
+  </p:timing>
+</p:sld>
+</file>
+
+<file path=ppt/slides/slide8.xml><?xml version="1.0" encoding="utf-8"?>
+<p:sld xmlns:a="http://schemas.openxmlformats.org/drawingml/2006/main" xmlns:r="http://schemas.openxmlformats.org/officeDocument/2006/relationships" xmlns:p="http://schemas.openxmlformats.org/presentationml/2006/main">
+  <p:cSld>
+    <p:spTree>
+      <p:nvGrpSpPr>
+        <p:cNvPr id="1" name=""/>
+        <p:cNvGrpSpPr/>
+        <p:nvPr/>
+      </p:nvGrpSpPr>
+      <p:grpSpPr>
+        <a:xfrm>
+          <a:off x="0" y="0"/>
+          <a:ext cx="0" cy="0"/>
+          <a:chOff x="0" y="0"/>
+          <a:chExt cx="0" cy="0"/>
+        </a:xfrm>
+      </p:grpSpPr>
+      <p:pic>
+        <p:nvPicPr>
+          <p:cNvPr id="8" name="Kép 7" descr="A képen szöveg látható&#10;&#10;Automatikusan generált leírás">
+            <a:extLst>
+              <a:ext uri="{FF2B5EF4-FFF2-40B4-BE49-F238E27FC236}">
+                <a16:creationId xmlns:a16="http://schemas.microsoft.com/office/drawing/2014/main" id="{BA0821B6-25AB-8AC5-53A1-911F6A3BB134}"/>
+              </a:ext>
+            </a:extLst>
+          </p:cNvPr>
+          <p:cNvPicPr>
+            <a:picLocks noChangeAspect="1"/>
+          </p:cNvPicPr>
+          <p:nvPr/>
+        </p:nvPicPr>
+        <p:blipFill>
+          <a:blip r:embed="rId2"/>
+          <a:stretch>
+            <a:fillRect/>
+          </a:stretch>
+        </p:blipFill>
+        <p:spPr>
+          <a:xfrm>
+            <a:off x="1308100" y="1582662"/>
+            <a:ext cx="8301379" cy="4973714"/>
+          </a:xfrm>
+          <a:prstGeom prst="rect">
+            <a:avLst/>
+          </a:prstGeom>
+        </p:spPr>
+      </p:pic>
+      <p:sp>
+        <p:nvSpPr>
+          <p:cNvPr id="2" name="Cím 1">
+            <a:extLst>
+              <a:ext uri="{FF2B5EF4-FFF2-40B4-BE49-F238E27FC236}">
+                <a16:creationId xmlns:a16="http://schemas.microsoft.com/office/drawing/2014/main" id="{170EA487-E2B0-56E3-AB4F-1C275BBFF886}"/>
+              </a:ext>
+            </a:extLst>
+          </p:cNvPr>
+          <p:cNvSpPr>
+            <a:spLocks noGrp="1"/>
+          </p:cNvSpPr>
+          <p:nvPr>
+            <p:ph type="title"/>
+          </p:nvPr>
+        </p:nvSpPr>
+        <p:spPr>
+          <a:xfrm>
+            <a:off x="1141413" y="0"/>
+            <a:ext cx="9905998" cy="1206500"/>
+          </a:xfrm>
+        </p:spPr>
+        <p:txBody>
+          <a:bodyPr/>
+          <a:lstStyle/>
+          <a:p>
+            <a:pPr algn="ctr"/>
+            <a:r>
+              <a:rPr lang="en-US" dirty="0"/>
+              <a:t>Beef framework</a:t>
+            </a:r>
+          </a:p>
+        </p:txBody>
+      </p:sp>
+      <p:pic>
+        <p:nvPicPr>
+          <p:cNvPr id="5" name="Tartalom helye 4" descr="A képen asztal látható">
+            <a:extLst>
+              <a:ext uri="{FF2B5EF4-FFF2-40B4-BE49-F238E27FC236}">
+                <a16:creationId xmlns:a16="http://schemas.microsoft.com/office/drawing/2014/main" id="{FF20ACD9-6C0E-772C-7E06-8F3551D49BF2}"/>
+              </a:ext>
+            </a:extLst>
+          </p:cNvPr>
+          <p:cNvPicPr>
+            <a:picLocks noGrp="1" noChangeAspect="1"/>
+          </p:cNvPicPr>
+          <p:nvPr>
+            <p:ph idx="1"/>
+          </p:nvPr>
+        </p:nvPicPr>
+        <p:blipFill>
+          <a:blip r:embed="rId3"/>
+          <a:stretch>
+            <a:fillRect/>
+          </a:stretch>
+        </p:blipFill>
+        <p:spPr>
+          <a:xfrm>
+            <a:off x="5687417" y="2876034"/>
+            <a:ext cx="5359994" cy="3340100"/>
+          </a:xfrm>
+        </p:spPr>
+      </p:pic>
+      <p:sp>
+        <p:nvSpPr>
+          <p:cNvPr id="6" name="Szövegdoboz 5">
+            <a:extLst>
+              <a:ext uri="{FF2B5EF4-FFF2-40B4-BE49-F238E27FC236}">
+                <a16:creationId xmlns:a16="http://schemas.microsoft.com/office/drawing/2014/main" id="{68253B07-872E-6A31-2AD7-1FCB4F873AB9}"/>
+              </a:ext>
+            </a:extLst>
+          </p:cNvPr>
+          <p:cNvSpPr txBox="1"/>
+          <p:nvPr/>
+        </p:nvSpPr>
+        <p:spPr>
+          <a:xfrm>
+            <a:off x="417512" y="1021834"/>
+            <a:ext cx="4306887" cy="369332"/>
+          </a:xfrm>
+          <a:prstGeom prst="rect">
+            <a:avLst/>
+          </a:prstGeom>
+          <a:noFill/>
+        </p:spPr>
+        <p:txBody>
+          <a:bodyPr wrap="square" rtlCol="0">
+            <a:spAutoFit/>
+          </a:bodyPr>
+          <a:lstStyle/>
+          <a:p>
+            <a:pPr marL="285750" indent="-285750">
+              <a:buFont typeface="Arial" panose="020B0604020202020204" pitchFamily="34" charset="0"/>
+              <a:buChar char="•"/>
+            </a:pPr>
+            <a:r>
+              <a:rPr lang="en-US" b="1" dirty="0"/>
+              <a:t>Browser Exploitation Framework</a:t>
+            </a:r>
+          </a:p>
+        </p:txBody>
+      </p:sp>
+      <p:pic>
+        <p:nvPicPr>
+          <p:cNvPr id="9" name="Kép 8">
+            <a:extLst>
+              <a:ext uri="{FF2B5EF4-FFF2-40B4-BE49-F238E27FC236}">
+                <a16:creationId xmlns:a16="http://schemas.microsoft.com/office/drawing/2014/main" id="{D5803735-DEFB-2BC2-F2BD-46DE3987975E}"/>
+              </a:ext>
+            </a:extLst>
+          </p:cNvPr>
+          <p:cNvPicPr>
+            <a:picLocks noChangeAspect="1"/>
+          </p:cNvPicPr>
+          <p:nvPr/>
+        </p:nvPicPr>
+        <p:blipFill>
+          <a:blip r:embed="rId4"/>
+          <a:stretch>
+            <a:fillRect/>
+          </a:stretch>
+        </p:blipFill>
+        <p:spPr>
+          <a:xfrm>
+            <a:off x="10094911" y="80371"/>
+            <a:ext cx="1905000" cy="1419225"/>
+          </a:xfrm>
+          <a:prstGeom prst="rect">
+            <a:avLst/>
+          </a:prstGeom>
+        </p:spPr>
+      </p:pic>
+    </p:spTree>
+    <p:extLst>
+      <p:ext uri="{BB962C8B-B14F-4D97-AF65-F5344CB8AC3E}">
+        <p14:creationId xmlns:p14="http://schemas.microsoft.com/office/powerpoint/2010/main" val="1073165848"/>
+      </p:ext>
+    </p:extLst>
+  </p:cSld>
+  <p:clrMapOvr>
+    <a:masterClrMapping/>
+  </p:clrMapOvr>
+  <p:timing>
+    <p:tnLst>
+      <p:par>
+        <p:cTn id="1" dur="indefinite" restart="never" nodeType="tmRoot">
+          <p:childTnLst>
+            <p:seq concurrent="1" nextAc="seek">
+              <p:cTn id="2" dur="indefinite" nodeType="mainSeq">
+                <p:childTnLst>
+                  <p:par>
+                    <p:cTn id="3" fill="hold">
+                      <p:stCondLst>
+                        <p:cond delay="indefinite"/>
+                        <p:cond evt="onBegin" delay="0">
+                          <p:tn val="2"/>
+                        </p:cond>
+                      </p:stCondLst>
+                      <p:childTnLst>
+                        <p:par>
+                          <p:cTn id="4" fill="hold">
+                            <p:stCondLst>
+                              <p:cond delay="0"/>
+                            </p:stCondLst>
+                            <p:childTnLst>
+                              <p:par>
+                                <p:cTn id="5" presetID="1" presetClass="entr" presetSubtype="0" fill="hold" nodeType="afterEffect">
+                                  <p:stCondLst>
+                                    <p:cond delay="500"/>
+                                  </p:stCondLst>
+                                  <p:childTnLst>
+                                    <p:set>
+                                      <p:cBhvr>
+                                        <p:cTn id="6" dur="1" fill="hold">
+                                          <p:stCondLst>
+                                            <p:cond delay="0"/>
+                                          </p:stCondLst>
+                                        </p:cTn>
+                                        <p:tgtEl>
+                                          <p:spTgt spid="9"/>
+                                        </p:tgtEl>
+                                        <p:attrNameLst>
+                                          <p:attrName>style.visibility</p:attrName>
+                                        </p:attrNameLst>
+                                      </p:cBhvr>
+                                      <p:to>
+                                        <p:strVal val="visible"/>
+                                      </p:to>
+                                    </p:set>
+                                  </p:childTnLst>
+                                </p:cTn>
+                              </p:par>
+                            </p:childTnLst>
+                          </p:cTn>
+                        </p:par>
+                      </p:childTnLst>
+                    </p:cTn>
+                  </p:par>
+                </p:childTnLst>
+              </p:cTn>
+              <p:prevCondLst>
+                <p:cond evt="onPrev" delay="0">
+                  <p:tgtEl>
+                    <p:sldTgt/>
+                  </p:tgtEl>
+                </p:cond>
+              </p:prevCondLst>
+              <p:nextCondLst>
+                <p:cond evt="onNext" delay="0">
+                  <p:tgtEl>
+                    <p:sldTgt/>
+                  </p:tgtEl>
+                </p:cond>
+              </p:nextCondLst>
+            </p:seq>
+          </p:childTnLst>
+        </p:cTn>
+      </p:par>
+    </p:tnLst>
+  </p:timing>
+</p:sld>
+</file>
+
+<file path=ppt/slides/slide9.xml><?xml version="1.0" encoding="utf-8"?>
+<p:sld xmlns:a="http://schemas.openxmlformats.org/drawingml/2006/main" xmlns:r="http://schemas.openxmlformats.org/officeDocument/2006/relationships" xmlns:p="http://schemas.openxmlformats.org/presentationml/2006/main">
+  <p:cSld>
+    <p:spTree>
+      <p:nvGrpSpPr>
+        <p:cNvPr id="1" name=""/>
+        <p:cNvGrpSpPr/>
+        <p:nvPr/>
+      </p:nvGrpSpPr>
+      <p:grpSpPr>
+        <a:xfrm>
+          <a:off x="0" y="0"/>
+          <a:ext cx="0" cy="0"/>
+          <a:chOff x="0" y="0"/>
+          <a:chExt cx="0" cy="0"/>
+        </a:xfrm>
+      </p:grpSpPr>
+      <p:sp>
+        <p:nvSpPr>
+          <p:cNvPr id="2" name="Cím 1">
+            <a:extLst>
+              <a:ext uri="{FF2B5EF4-FFF2-40B4-BE49-F238E27FC236}">
+                <a16:creationId xmlns:a16="http://schemas.microsoft.com/office/drawing/2014/main" id="{34E7BCAD-15F2-2400-3156-791D716B0F41}"/>
+              </a:ext>
+            </a:extLst>
+          </p:cNvPr>
+          <p:cNvSpPr>
+            <a:spLocks noGrp="1"/>
+          </p:cNvSpPr>
+          <p:nvPr>
+            <p:ph type="title"/>
+          </p:nvPr>
+        </p:nvSpPr>
+        <p:spPr>
+          <a:xfrm>
+            <a:off x="1143001" y="203200"/>
+            <a:ext cx="9905998" cy="1168400"/>
+          </a:xfrm>
+        </p:spPr>
+        <p:txBody>
+          <a:bodyPr/>
+          <a:lstStyle/>
+          <a:p>
+            <a:pPr algn="ctr"/>
+            <a:r>
+              <a:rPr lang="en-US" dirty="0"/>
+              <a:t>Metasploit framework</a:t>
+            </a:r>
+          </a:p>
+        </p:txBody>
+      </p:sp>
+      <p:pic>
+        <p:nvPicPr>
+          <p:cNvPr id="8" name="Tartalom helye 7">
+            <a:extLst>
+              <a:ext uri="{FF2B5EF4-FFF2-40B4-BE49-F238E27FC236}">
+                <a16:creationId xmlns:a16="http://schemas.microsoft.com/office/drawing/2014/main" id="{1EFF8E88-6618-896F-C09A-21C93774F2EA}"/>
+              </a:ext>
+            </a:extLst>
+          </p:cNvPr>
+          <p:cNvPicPr>
+            <a:picLocks noGrp="1" noChangeAspect="1"/>
+          </p:cNvPicPr>
+          <p:nvPr>
+            <p:ph idx="1"/>
+          </p:nvPr>
+        </p:nvPicPr>
+        <p:blipFill>
+          <a:blip r:embed="rId2"/>
+          <a:stretch>
+            <a:fillRect/>
+          </a:stretch>
+        </p:blipFill>
+        <p:spPr>
+          <a:xfrm>
+            <a:off x="9966325" y="203200"/>
+            <a:ext cx="1882774" cy="1794394"/>
+          </a:xfrm>
+          <a:prstGeom prst="rect">
+            <a:avLst/>
+          </a:prstGeom>
+        </p:spPr>
+      </p:pic>
+      <p:sp>
+        <p:nvSpPr>
+          <p:cNvPr id="9" name="Szövegdoboz 8">
+            <a:extLst>
+              <a:ext uri="{FF2B5EF4-FFF2-40B4-BE49-F238E27FC236}">
+                <a16:creationId xmlns:a16="http://schemas.microsoft.com/office/drawing/2014/main" id="{BDF2C402-BC5C-355B-8821-BDB30CAC23F3}"/>
+              </a:ext>
+            </a:extLst>
+          </p:cNvPr>
+          <p:cNvSpPr txBox="1"/>
+          <p:nvPr/>
+        </p:nvSpPr>
+        <p:spPr>
+          <a:xfrm>
+            <a:off x="482600" y="1727200"/>
+            <a:ext cx="4546600" cy="1323439"/>
+          </a:xfrm>
+          <a:prstGeom prst="rect">
+            <a:avLst/>
+          </a:prstGeom>
+          <a:noFill/>
+        </p:spPr>
+        <p:txBody>
+          <a:bodyPr wrap="square" rtlCol="0">
+            <a:spAutoFit/>
+          </a:bodyPr>
+          <a:lstStyle/>
+          <a:p>
+            <a:pPr marL="285750" indent="-285750">
+              <a:buFont typeface="Arial" panose="020B0604020202020204" pitchFamily="34" charset="0"/>
+              <a:buChar char="•"/>
+            </a:pPr>
+            <a:r>
+              <a:rPr lang="en-US" sz="2000" b="1" dirty="0" err="1"/>
+              <a:t>számítógép-biztonsági</a:t>
+            </a:r>
+            <a:r>
+              <a:rPr lang="en-US" sz="2000" b="1" dirty="0"/>
+              <a:t> program</a:t>
+            </a:r>
+          </a:p>
+          <a:p>
+            <a:pPr marL="285750" indent="-285750">
+              <a:buFont typeface="Arial" panose="020B0604020202020204" pitchFamily="34" charset="0"/>
+              <a:buChar char="•"/>
+            </a:pPr>
+            <a:r>
+              <a:rPr lang="en-US" sz="2000" dirty="0"/>
+              <a:t> </a:t>
+            </a:r>
+            <a:r>
+              <a:rPr lang="en-US" sz="2000" dirty="0">
+                <a:hlinkClick r:id="rId3" tooltip="Exploit"/>
+              </a:rPr>
+              <a:t>exploit</a:t>
+            </a:r>
+            <a:r>
+              <a:rPr lang="en-US" sz="2000" dirty="0"/>
+              <a:t> </a:t>
+            </a:r>
+            <a:r>
+              <a:rPr lang="en-US" sz="2000" dirty="0" err="1"/>
+              <a:t>kódot</a:t>
+            </a:r>
+            <a:r>
+              <a:rPr lang="en-US" sz="2000" dirty="0"/>
+              <a:t> </a:t>
+            </a:r>
+            <a:r>
+              <a:rPr lang="en-US" sz="2000" dirty="0" err="1"/>
+              <a:t>lehet</a:t>
+            </a:r>
+            <a:r>
+              <a:rPr lang="en-US" sz="2000" dirty="0"/>
+              <a:t> </a:t>
+            </a:r>
+            <a:r>
+              <a:rPr lang="en-US" sz="2000" dirty="0" err="1"/>
+              <a:t>fejleszteni</a:t>
+            </a:r>
+            <a:endParaRPr lang="en-US" sz="2000" dirty="0"/>
+          </a:p>
+          <a:p>
+            <a:pPr marL="285750" indent="-285750">
+              <a:buFont typeface="Arial" panose="020B0604020202020204" pitchFamily="34" charset="0"/>
+              <a:buChar char="•"/>
+            </a:pPr>
+            <a:r>
+              <a:rPr lang="en-US" sz="2000" b="1" dirty="0" err="1"/>
+              <a:t>távoli</a:t>
+            </a:r>
+            <a:r>
+              <a:rPr lang="en-US" sz="2000" b="1" dirty="0"/>
+              <a:t> </a:t>
+            </a:r>
+            <a:r>
+              <a:rPr lang="en-US" sz="2000" b="1" dirty="0" err="1"/>
+              <a:t>vezérlés</a:t>
+            </a:r>
+            <a:endParaRPr lang="en-US" sz="2000" b="1" dirty="0"/>
+          </a:p>
+          <a:p>
+            <a:pPr marL="285750" indent="-285750">
+              <a:buFont typeface="Arial" panose="020B0604020202020204" pitchFamily="34" charset="0"/>
+              <a:buChar char="•"/>
+            </a:pPr>
+            <a:r>
+              <a:rPr lang="en-US" sz="2000" b="1" dirty="0" err="1"/>
+              <a:t>rengeteg</a:t>
+            </a:r>
+            <a:r>
+              <a:rPr lang="en-US" sz="2000" b="1" dirty="0"/>
+              <a:t> payload</a:t>
+            </a:r>
+          </a:p>
+        </p:txBody>
+      </p:sp>
+      <p:sp>
+        <p:nvSpPr>
+          <p:cNvPr id="11" name="Szövegdoboz 10">
+            <a:extLst>
+              <a:ext uri="{FF2B5EF4-FFF2-40B4-BE49-F238E27FC236}">
+                <a16:creationId xmlns:a16="http://schemas.microsoft.com/office/drawing/2014/main" id="{6E0B023E-5C79-FE15-DCCF-893AB14A0C99}"/>
+              </a:ext>
+            </a:extLst>
+          </p:cNvPr>
+          <p:cNvSpPr txBox="1"/>
+          <p:nvPr/>
+        </p:nvSpPr>
+        <p:spPr>
+          <a:xfrm>
+            <a:off x="482600" y="3644900"/>
+            <a:ext cx="7048500" cy="1200329"/>
+          </a:xfrm>
+          <a:prstGeom prst="rect">
+            <a:avLst/>
+          </a:prstGeom>
+          <a:noFill/>
+        </p:spPr>
+        <p:txBody>
+          <a:bodyPr wrap="square" rtlCol="0">
+            <a:spAutoFit/>
+          </a:bodyPr>
+          <a:lstStyle/>
+          <a:p>
+            <a:pPr marL="285750" indent="-285750">
+              <a:buFont typeface="Arial" panose="020B0604020202020204" pitchFamily="34" charset="0"/>
+              <a:buChar char="•"/>
+            </a:pPr>
+            <a:r>
+              <a:rPr lang="en-US" b="1" dirty="0"/>
+              <a:t>Command shell – </a:t>
+            </a:r>
+            <a:r>
+              <a:rPr lang="en-US" b="1" dirty="0" err="1"/>
+              <a:t>távoli</a:t>
+            </a:r>
+            <a:r>
+              <a:rPr lang="en-US" b="1" dirty="0"/>
+              <a:t> </a:t>
+            </a:r>
+            <a:r>
+              <a:rPr lang="en-US" b="1" dirty="0" err="1"/>
+              <a:t>vezérlés</a:t>
+            </a:r>
+            <a:r>
+              <a:rPr lang="en-US" b="1" dirty="0"/>
+              <a:t> – </a:t>
+            </a:r>
+            <a:r>
+              <a:rPr lang="en-US" b="1" dirty="0" err="1"/>
+              <a:t>tetszőleges</a:t>
+            </a:r>
+            <a:r>
+              <a:rPr lang="en-US" b="1" dirty="0"/>
+              <a:t> </a:t>
+            </a:r>
+            <a:r>
+              <a:rPr lang="en-US" b="1" dirty="0" err="1"/>
+              <a:t>parancsok</a:t>
+            </a:r>
+            <a:endParaRPr lang="en-US" b="1" dirty="0"/>
+          </a:p>
+          <a:p>
+            <a:pPr marL="285750" indent="-285750">
+              <a:buFont typeface="Arial" panose="020B0604020202020204" pitchFamily="34" charset="0"/>
+              <a:buChar char="•"/>
+            </a:pPr>
+            <a:r>
+              <a:rPr lang="en-US" b="1" dirty="0"/>
+              <a:t>Meterpreter – </a:t>
+            </a:r>
+            <a:r>
+              <a:rPr lang="en-US" b="1" dirty="0" err="1"/>
+              <a:t>lehetővé</a:t>
+            </a:r>
+            <a:r>
+              <a:rPr lang="en-US" b="1" dirty="0"/>
+              <a:t> </a:t>
+            </a:r>
+            <a:r>
+              <a:rPr lang="en-US" b="1" dirty="0" err="1"/>
+              <a:t>teszik</a:t>
+            </a:r>
+            <a:r>
+              <a:rPr lang="en-US" b="1" dirty="0"/>
+              <a:t> </a:t>
+            </a:r>
+            <a:r>
+              <a:rPr lang="en-US" b="1" dirty="0" err="1"/>
+              <a:t>az</a:t>
+            </a:r>
+            <a:r>
+              <a:rPr lang="en-US" b="1" dirty="0"/>
+              <a:t> </a:t>
+            </a:r>
+            <a:r>
+              <a:rPr lang="en-US" b="1" dirty="0" err="1"/>
+              <a:t>irányítást</a:t>
+            </a:r>
+            <a:endParaRPr lang="en-US" b="1" dirty="0"/>
+          </a:p>
+          <a:p>
+            <a:pPr marL="285750" indent="-285750">
+              <a:buFont typeface="Arial" panose="020B0604020202020204" pitchFamily="34" charset="0"/>
+              <a:buChar char="•"/>
+            </a:pPr>
+            <a:r>
+              <a:rPr lang="en-US" b="1" dirty="0" err="1"/>
+              <a:t>Dinamikus</a:t>
+            </a:r>
+            <a:r>
+              <a:rPr lang="en-US" b="1" dirty="0"/>
+              <a:t> </a:t>
+            </a:r>
+            <a:r>
+              <a:rPr lang="en-US" b="1" dirty="0" err="1"/>
+              <a:t>payloadok</a:t>
+            </a:r>
+            <a:r>
+              <a:rPr lang="en-US" b="1" dirty="0"/>
+              <a:t> – </a:t>
+            </a:r>
+            <a:r>
+              <a:rPr lang="en-US" b="1" dirty="0" err="1"/>
+              <a:t>egyedi</a:t>
+            </a:r>
+            <a:r>
+              <a:rPr lang="en-US" b="1" dirty="0"/>
+              <a:t> </a:t>
+            </a:r>
+            <a:r>
+              <a:rPr lang="en-US" b="1" dirty="0" err="1"/>
+              <a:t>payloadok</a:t>
+            </a:r>
+            <a:endParaRPr lang="en-US" b="1" dirty="0"/>
+          </a:p>
+          <a:p>
+            <a:pPr marL="285750" indent="-285750">
+              <a:buFont typeface="Arial" panose="020B0604020202020204" pitchFamily="34" charset="0"/>
+              <a:buChar char="•"/>
+            </a:pPr>
+            <a:r>
+              <a:rPr lang="en-US" b="1" dirty="0" err="1"/>
+              <a:t>Statikus</a:t>
+            </a:r>
+            <a:r>
+              <a:rPr lang="en-US" b="1" dirty="0"/>
+              <a:t> </a:t>
+            </a:r>
+            <a:r>
+              <a:rPr lang="en-US" b="1" dirty="0" err="1"/>
+              <a:t>payloadok</a:t>
+            </a:r>
+            <a:r>
+              <a:rPr lang="en-US" b="1" dirty="0"/>
+              <a:t> – IP/PORT </a:t>
+            </a:r>
+            <a:r>
+              <a:rPr lang="en-US" b="1" dirty="0" err="1"/>
+              <a:t>továbbítást</a:t>
+            </a:r>
+            <a:r>
+              <a:rPr lang="en-US" b="1" dirty="0"/>
+              <a:t> </a:t>
+            </a:r>
+            <a:r>
+              <a:rPr lang="en-US" b="1" dirty="0" err="1"/>
+              <a:t>tesznek</a:t>
+            </a:r>
+            <a:r>
+              <a:rPr lang="en-US" b="1" dirty="0"/>
+              <a:t> </a:t>
+            </a:r>
+            <a:r>
+              <a:rPr lang="en-US" b="1" dirty="0" err="1"/>
+              <a:t>lehetővé</a:t>
+            </a:r>
+            <a:endParaRPr lang="en-US" b="1" dirty="0"/>
+          </a:p>
+        </p:txBody>
+      </p:sp>
+      <p:sp>
+        <p:nvSpPr>
+          <p:cNvPr id="12" name="Szövegdoboz 11">
+            <a:extLst>
+              <a:ext uri="{FF2B5EF4-FFF2-40B4-BE49-F238E27FC236}">
+                <a16:creationId xmlns:a16="http://schemas.microsoft.com/office/drawing/2014/main" id="{4EA3FBC7-F71D-3489-9C00-7317E6C3DFB4}"/>
+              </a:ext>
+            </a:extLst>
+          </p:cNvPr>
+          <p:cNvSpPr txBox="1"/>
+          <p:nvPr/>
+        </p:nvSpPr>
+        <p:spPr>
+          <a:xfrm>
+            <a:off x="660400" y="5139273"/>
+            <a:ext cx="9026525" cy="369332"/>
+          </a:xfrm>
+          <a:prstGeom prst="rect">
+            <a:avLst/>
+          </a:prstGeom>
+          <a:noFill/>
+        </p:spPr>
+        <p:txBody>
+          <a:bodyPr wrap="square" rtlCol="0">
+            <a:spAutoFit/>
+          </a:bodyPr>
+          <a:lstStyle/>
+          <a:p>
+            <a:r>
+              <a:rPr lang="en-US" dirty="0" err="1">
+                <a:solidFill>
+                  <a:srgbClr val="FF0000"/>
+                </a:solidFill>
+              </a:rPr>
+              <a:t>Ezeket</a:t>
+            </a:r>
+            <a:r>
+              <a:rPr lang="en-US" dirty="0">
+                <a:solidFill>
+                  <a:srgbClr val="FF0000"/>
+                </a:solidFill>
+              </a:rPr>
+              <a:t> a </a:t>
+            </a:r>
+            <a:r>
+              <a:rPr lang="en-US" dirty="0" err="1">
+                <a:solidFill>
+                  <a:srgbClr val="FF0000"/>
+                </a:solidFill>
+              </a:rPr>
+              <a:t>PayLoad</a:t>
+            </a:r>
+            <a:r>
+              <a:rPr lang="en-US" dirty="0">
+                <a:solidFill>
+                  <a:srgbClr val="FF0000"/>
+                </a:solidFill>
+              </a:rPr>
+              <a:t> –</a:t>
+            </a:r>
+            <a:r>
+              <a:rPr lang="en-US" dirty="0" err="1">
+                <a:solidFill>
+                  <a:srgbClr val="FF0000"/>
+                </a:solidFill>
+              </a:rPr>
+              <a:t>okat</a:t>
+            </a:r>
+            <a:r>
+              <a:rPr lang="en-US" dirty="0">
+                <a:solidFill>
+                  <a:srgbClr val="FF0000"/>
+                </a:solidFill>
+              </a:rPr>
+              <a:t> a </a:t>
+            </a:r>
+            <a:r>
+              <a:rPr lang="en-US" dirty="0" err="1">
+                <a:solidFill>
+                  <a:srgbClr val="FF0000"/>
+                </a:solidFill>
+              </a:rPr>
+              <a:t>vírusírtók</a:t>
+            </a:r>
+            <a:r>
+              <a:rPr lang="en-US" dirty="0">
+                <a:solidFill>
+                  <a:srgbClr val="FF0000"/>
+                </a:solidFill>
+              </a:rPr>
+              <a:t> </a:t>
+            </a:r>
+            <a:r>
+              <a:rPr lang="en-US" dirty="0" err="1">
+                <a:solidFill>
+                  <a:srgbClr val="FF0000"/>
+                </a:solidFill>
+              </a:rPr>
+              <a:t>észlelni</a:t>
+            </a:r>
+            <a:r>
+              <a:rPr lang="en-US" dirty="0">
+                <a:solidFill>
+                  <a:srgbClr val="FF0000"/>
+                </a:solidFill>
+              </a:rPr>
+              <a:t> </a:t>
+            </a:r>
+            <a:r>
+              <a:rPr lang="en-US" dirty="0" err="1">
+                <a:solidFill>
+                  <a:srgbClr val="FF0000"/>
+                </a:solidFill>
+              </a:rPr>
+              <a:t>szokták</a:t>
+            </a:r>
+            <a:r>
+              <a:rPr lang="en-US" dirty="0">
+                <a:solidFill>
+                  <a:srgbClr val="FF0000"/>
+                </a:solidFill>
+              </a:rPr>
+              <a:t>, </a:t>
+            </a:r>
+            <a:r>
+              <a:rPr lang="en-US" dirty="0" err="1">
+                <a:solidFill>
+                  <a:srgbClr val="FF0000"/>
+                </a:solidFill>
+              </a:rPr>
+              <a:t>és</a:t>
+            </a:r>
+            <a:r>
+              <a:rPr lang="en-US" dirty="0">
+                <a:solidFill>
+                  <a:srgbClr val="FF0000"/>
+                </a:solidFill>
+              </a:rPr>
+              <a:t> </a:t>
+            </a:r>
+            <a:r>
+              <a:rPr lang="en-US" dirty="0" err="1">
+                <a:solidFill>
+                  <a:srgbClr val="FF0000"/>
+                </a:solidFill>
+              </a:rPr>
+              <a:t>törvénytelenek</a:t>
+            </a:r>
+            <a:r>
+              <a:rPr lang="en-US" dirty="0">
+                <a:solidFill>
+                  <a:srgbClr val="FF0000"/>
+                </a:solidFill>
+              </a:rPr>
+              <a:t> is!</a:t>
+            </a:r>
+          </a:p>
+        </p:txBody>
+      </p:sp>
+    </p:spTree>
+    <p:extLst>
+      <p:ext uri="{BB962C8B-B14F-4D97-AF65-F5344CB8AC3E}">
+        <p14:creationId xmlns:p14="http://schemas.microsoft.com/office/powerpoint/2010/main" val="3328650405"/>
+      </p:ext>
+    </p:extLst>
+  </p:cSld>
+  <p:clrMapOvr>
+    <a:masterClrMapping/>
+  </p:clrMapOvr>
+  <p:timing>
+    <p:tnLst>
+      <p:par>
+        <p:cTn id="1" dur="indefinite" restart="never" nodeType="tmRoot">
+          <p:childTnLst>
+            <p:seq concurrent="1" nextAc="seek">
+              <p:cTn id="2" dur="indefinite" nodeType="mainSeq">
+                <p:childTnLst>
+                  <p:par>
+                    <p:cTn id="3" fill="hold">
+                      <p:stCondLst>
+                        <p:cond delay="indefinite"/>
+                        <p:cond evt="onBegin" delay="0">
+                          <p:tn val="2"/>
+                        </p:cond>
+                      </p:stCondLst>
+                      <p:childTnLst>
+                        <p:par>
+                          <p:cTn id="4" fill="hold">
+                            <p:stCondLst>
+                              <p:cond delay="0"/>
+                            </p:stCondLst>
+                            <p:childTnLst>
+                              <p:par>
+                                <p:cTn id="5" presetID="1" presetClass="entr" presetSubtype="0" fill="hold" nodeType="afterEffect">
+                                  <p:stCondLst>
+                                    <p:cond delay="500"/>
+                                  </p:stCondLst>
+                                  <p:childTnLst>
+                                    <p:set>
+                                      <p:cBhvr>
+                                        <p:cTn id="6" dur="1" fill="hold">
+                                          <p:stCondLst>
+                                            <p:cond delay="0"/>
+                                          </p:stCondLst>
+                                        </p:cTn>
+                                        <p:tgtEl>
+                                          <p:spTgt spid="8"/>
+                                        </p:tgtEl>
+                                        <p:attrNameLst>
+                                          <p:attrName>style.visibility</p:attrName>
+                                        </p:attrNameLst>
+                                      </p:cBhvr>
+                                      <p:to>
+                                        <p:strVal val="visible"/>
+                                      </p:to>
+                                    </p:set>
+                                  </p:childTnLst>
+                                </p:cTn>
+                              </p:par>
+                            </p:childTnLst>
+                          </p:cTn>
+                        </p:par>
+                      </p:childTnLst>
+                    </p:cTn>
+                  </p:par>
+                </p:childTnLst>
+              </p:cTn>
+              <p:prevCondLst>
+                <p:cond evt="onPrev" delay="0">
+                  <p:tgtEl>
+                    <p:sldTgt/>
+                  </p:tgtEl>
+                </p:cond>
+              </p:prevCondLst>
+              <p:nextCondLst>
+                <p:cond evt="onNext" delay="0">
+                  <p:tgtEl>
+                    <p:sldTgt/>
+                  </p:tgtEl>
+                </p:cond>
+              </p:nextCondLst>
+            </p:seq>
+          </p:childTnLst>
+        </p:cTn>
+      </p:par>
+    </p:tnLst>
+  </p:timing>
 </p:sld>
 </file>
 

</xml_diff>